<commit_message>
Read label, data from file
</commit_message>
<xml_diff>
--- a/assignment2/Assignment2.pptx
+++ b/assignment2/Assignment2.pptx
@@ -5,7 +5,7 @@
     <p:sldMasterId id="2147483648" r:id="rId1"/>
   </p:sldMasterIdLst>
   <p:notesMasterIdLst>
-    <p:notesMasterId r:id="rId8"/>
+    <p:notesMasterId r:id="rId9"/>
   </p:notesMasterIdLst>
   <p:sldIdLst>
     <p:sldId id="259" r:id="rId2"/>
@@ -14,6 +14,7 @@
     <p:sldId id="257" r:id="rId5"/>
     <p:sldId id="260" r:id="rId6"/>
     <p:sldId id="261" r:id="rId7"/>
+    <p:sldId id="262" r:id="rId8"/>
   </p:sldIdLst>
   <p:sldSz cx="12192000" cy="6858000"/>
   <p:notesSz cx="6858000" cy="9144000"/>
@@ -112,6 +113,11 @@
       </a:defRPr>
     </a:lvl9pPr>
   </p:defaultTextStyle>
+  <p:extLst>
+    <p:ext uri="{EFAFB233-063F-42B5-8137-9DF3F51BA10A}">
+      <p15:sldGuideLst xmlns:p15="http://schemas.microsoft.com/office/powerpoint/2012/main"/>
+    </p:ext>
+  </p:extLst>
 </p:presentation>
 </file>
 
@@ -6140,6 +6146,216 @@
     <p:extLst>
       <p:ext uri="{BB962C8B-B14F-4D97-AF65-F5344CB8AC3E}">
         <p14:creationId xmlns:p14="http://schemas.microsoft.com/office/powerpoint/2010/main" val="1386237784"/>
+      </p:ext>
+    </p:extLst>
+  </p:cSld>
+  <p:clrMapOvr>
+    <a:masterClrMapping/>
+  </p:clrMapOvr>
+</p:sld>
+</file>
+
+<file path=ppt/slides/slide7.xml><?xml version="1.0" encoding="utf-8"?>
+<p:sld xmlns:a="http://schemas.openxmlformats.org/drawingml/2006/main" xmlns:r="http://schemas.openxmlformats.org/officeDocument/2006/relationships" xmlns:p="http://schemas.openxmlformats.org/presentationml/2006/main">
+  <p:cSld>
+    <p:spTree>
+      <p:nvGrpSpPr>
+        <p:cNvPr id="1" name="">
+          <a:extLst>
+            <a:ext uri="{FF2B5EF4-FFF2-40B4-BE49-F238E27FC236}">
+              <a16:creationId xmlns:a16="http://schemas.microsoft.com/office/drawing/2014/main" id="{85491F18-1C2D-BDE8-7D3A-E29FB570F370}"/>
+            </a:ext>
+          </a:extLst>
+        </p:cNvPr>
+        <p:cNvGrpSpPr/>
+        <p:nvPr/>
+      </p:nvGrpSpPr>
+      <p:grpSpPr>
+        <a:xfrm>
+          <a:off x="0" y="0"/>
+          <a:ext cx="0" cy="0"/>
+          <a:chOff x="0" y="0"/>
+          <a:chExt cx="0" cy="0"/>
+        </a:xfrm>
+      </p:grpSpPr>
+      <p:sp>
+        <p:nvSpPr>
+          <p:cNvPr id="4" name="TextBox 3">
+            <a:extLst>
+              <a:ext uri="{FF2B5EF4-FFF2-40B4-BE49-F238E27FC236}">
+                <a16:creationId xmlns:a16="http://schemas.microsoft.com/office/drawing/2014/main" id="{A5906494-EE94-D717-6911-58E0E4545895}"/>
+              </a:ext>
+            </a:extLst>
+          </p:cNvPr>
+          <p:cNvSpPr txBox="1"/>
+          <p:nvPr/>
+        </p:nvSpPr>
+        <p:spPr>
+          <a:xfrm>
+            <a:off x="111760" y="345440"/>
+            <a:ext cx="12346940" cy="4524315"/>
+          </a:xfrm>
+          <a:prstGeom prst="rect">
+            <a:avLst/>
+          </a:prstGeom>
+          <a:noFill/>
+        </p:spPr>
+        <p:txBody>
+          <a:bodyPr wrap="square" rtlCol="0">
+            <a:spAutoFit/>
+          </a:bodyPr>
+          <a:lstStyle/>
+          <a:p>
+            <a:r>
+              <a:rPr lang="en-US" altLang="ko-KR" dirty="0"/>
+              <a:t>Read</a:t>
+            </a:r>
+            <a:r>
+              <a:rPr lang="ko-KR" altLang="en-US" dirty="0"/>
+              <a:t> </a:t>
+            </a:r>
+            <a:r>
+              <a:rPr lang="en-US" altLang="ko-KR" dirty="0"/>
+              <a:t>line</a:t>
+            </a:r>
+          </a:p>
+          <a:p>
+            <a:pPr marL="285750" indent="-285750">
+              <a:buFont typeface="Wingdings" panose="05000000000000000000" pitchFamily="2" charset="2"/>
+              <a:buChar char="è"/>
+            </a:pPr>
+            <a:r>
+              <a:rPr lang="en-US" altLang="ko-KR" dirty="0"/>
+              <a:t>Convert string to hex</a:t>
+            </a:r>
+          </a:p>
+          <a:p>
+            <a:pPr marL="285750" indent="-285750">
+              <a:buFont typeface="Wingdings" panose="05000000000000000000" pitchFamily="2" charset="2"/>
+              <a:buChar char="è"/>
+            </a:pPr>
+            <a:r>
+              <a:rPr lang="en-US" altLang="ko-KR" dirty="0"/>
+              <a:t>Output label, data</a:t>
+            </a:r>
+          </a:p>
+          <a:p>
+            <a:endParaRPr lang="en-US" altLang="ko-KR" dirty="0"/>
+          </a:p>
+          <a:p>
+            <a:r>
+              <a:rPr lang="en-US" altLang="ko-KR" dirty="0"/>
+              <a:t>If(!</a:t>
+            </a:r>
+            <a:r>
+              <a:rPr lang="en-US" altLang="ko-KR" dirty="0" err="1"/>
+              <a:t>cpu.on_process</a:t>
+            </a:r>
+            <a:r>
+              <a:rPr lang="en-US" altLang="ko-KR" dirty="0"/>
+              <a:t>)</a:t>
+            </a:r>
+          </a:p>
+          <a:p>
+            <a:r>
+              <a:rPr lang="en-US" altLang="ko-KR" dirty="0"/>
+              <a:t>-&gt; label, data = Read lines</a:t>
+            </a:r>
+          </a:p>
+          <a:p>
+            <a:r>
+              <a:rPr lang="en-US" altLang="ko-KR" dirty="0"/>
+              <a:t>(case)</a:t>
+            </a:r>
+          </a:p>
+          <a:p>
+            <a:r>
+              <a:rPr lang="en-US" altLang="ko-KR" dirty="0"/>
+              <a:t>Label 0 : memory access and mutex lock. and Set “</a:t>
+            </a:r>
+            <a:r>
+              <a:rPr lang="en-US" altLang="ko-KR" dirty="0" err="1"/>
+              <a:t>on_process</a:t>
+            </a:r>
+            <a:r>
+              <a:rPr lang="en-US" altLang="ko-KR" dirty="0"/>
+              <a:t>” until target cycle = latency (100)</a:t>
+            </a:r>
+          </a:p>
+          <a:p>
+            <a:r>
+              <a:rPr lang="en-US" altLang="ko-KR" dirty="0"/>
+              <a:t>Label 1 : memory access and mutex lock. And Set “</a:t>
+            </a:r>
+            <a:r>
+              <a:rPr lang="en-US" altLang="ko-KR" dirty="0" err="1"/>
+              <a:t>on_process</a:t>
+            </a:r>
+            <a:r>
+              <a:rPr lang="en-US" altLang="ko-KR" dirty="0"/>
+              <a:t>” until target cycle = latency (100)</a:t>
+            </a:r>
+          </a:p>
+          <a:p>
+            <a:r>
+              <a:rPr lang="en-US" altLang="ko-KR" dirty="0"/>
+              <a:t>Label 2 : compute cycle (hold). 	         And set “</a:t>
+            </a:r>
+            <a:r>
+              <a:rPr lang="en-US" altLang="ko-KR" dirty="0" err="1"/>
+              <a:t>on_process</a:t>
+            </a:r>
+            <a:r>
+              <a:rPr lang="en-US" altLang="ko-KR" dirty="0"/>
+              <a:t>” until target cycle = </a:t>
+            </a:r>
+            <a:r>
+              <a:rPr lang="en-US" altLang="ko-KR" dirty="0" err="1"/>
+              <a:t>input_data</a:t>
+            </a:r>
+            <a:r>
+              <a:rPr lang="en-US" altLang="ko-KR" dirty="0"/>
+              <a:t>(data)</a:t>
+            </a:r>
+          </a:p>
+          <a:p>
+            <a:endParaRPr lang="en-US" altLang="ko-KR" dirty="0"/>
+          </a:p>
+          <a:p>
+            <a:r>
+              <a:rPr lang="en-US" altLang="ko-KR" dirty="0"/>
+              <a:t>If(cycle == target cycle)</a:t>
+            </a:r>
+          </a:p>
+          <a:p>
+            <a:r>
+              <a:rPr lang="en-US" altLang="ko-KR" dirty="0"/>
+              <a:t> </a:t>
+            </a:r>
+            <a:r>
+              <a:rPr lang="en-US" altLang="ko-KR" dirty="0" err="1"/>
+              <a:t>cpu.on_process</a:t>
+            </a:r>
+            <a:r>
+              <a:rPr lang="en-US" altLang="ko-KR" dirty="0"/>
+              <a:t> = false;</a:t>
+            </a:r>
+          </a:p>
+          <a:p>
+            <a:endParaRPr lang="en-US" altLang="ko-KR" dirty="0"/>
+          </a:p>
+          <a:p>
+            <a:endParaRPr lang="en-US" altLang="ko-KR" dirty="0"/>
+          </a:p>
+          <a:p>
+            <a:endParaRPr lang="en-US" altLang="ko-KR" dirty="0"/>
+          </a:p>
+        </p:txBody>
+      </p:sp>
+    </p:spTree>
+    <p:extLst>
+      <p:ext uri="{BB962C8B-B14F-4D97-AF65-F5344CB8AC3E}">
+        <p14:creationId xmlns:p14="http://schemas.microsoft.com/office/powerpoint/2010/main" val="432048434"/>
       </p:ext>
     </p:extLst>
   </p:cSld>

</xml_diff>

<commit_message>
Added makefile, updated pptx, added TODO comments
</commit_message>
<xml_diff>
--- a/assignment2/Assignment2.pptx
+++ b/assignment2/Assignment2.pptx
@@ -206,7 +206,7 @@
           <a:p>
             <a:fld id="{E0526D6B-6785-48FA-9A0F-025C9B50690D}" type="datetimeFigureOut">
               <a:rPr lang="ko-KR" altLang="en-US" smtClean="0"/>
-              <a:t>2024-10-22</a:t>
+              <a:t>2024-10-24</a:t>
             </a:fld>
             <a:endParaRPr lang="ko-KR" altLang="en-US"/>
           </a:p>
@@ -532,6 +532,15 @@
             <a:endParaRPr lang="en-US" altLang="ko-KR" dirty="0"/>
           </a:p>
           <a:p>
+            <a:r>
+              <a:rPr lang="en-US" altLang="ko-KR" dirty="0"/>
+              <a:t>I think bus first would work better – have each CPU try to “drive” the bus in a cycle, then it broadcasts that state in the next cycle</a:t>
+            </a:r>
+          </a:p>
+          <a:p>
+            <a:endParaRPr lang="en-US" altLang="ko-KR" dirty="0"/>
+          </a:p>
+          <a:p>
             <a:endParaRPr lang="ko-KR" altLang="en-US" dirty="0"/>
           </a:p>
         </p:txBody>
@@ -647,6 +656,99 @@
     <p:extLst>
       <p:ext uri="{BB962C8B-B14F-4D97-AF65-F5344CB8AC3E}">
         <p14:creationId xmlns:p14="http://schemas.microsoft.com/office/powerpoint/2010/main" val="3463440433"/>
+      </p:ext>
+    </p:extLst>
+  </p:cSld>
+  <p:clrMapOvr>
+    <a:masterClrMapping/>
+  </p:clrMapOvr>
+</p:notes>
+</file>
+
+<file path=ppt/notesSlides/notesSlide3.xml><?xml version="1.0" encoding="utf-8"?>
+<p:notes xmlns:a="http://schemas.openxmlformats.org/drawingml/2006/main" xmlns:r="http://schemas.openxmlformats.org/officeDocument/2006/relationships" xmlns:p="http://schemas.openxmlformats.org/presentationml/2006/main">
+  <p:cSld>
+    <p:spTree>
+      <p:nvGrpSpPr>
+        <p:cNvPr id="1" name=""/>
+        <p:cNvGrpSpPr/>
+        <p:nvPr/>
+      </p:nvGrpSpPr>
+      <p:grpSpPr>
+        <a:xfrm>
+          <a:off x="0" y="0"/>
+          <a:ext cx="0" cy="0"/>
+          <a:chOff x="0" y="0"/>
+          <a:chExt cx="0" cy="0"/>
+        </a:xfrm>
+      </p:grpSpPr>
+      <p:sp>
+        <p:nvSpPr>
+          <p:cNvPr id="2" name="Slide Image Placeholder 1"/>
+          <p:cNvSpPr>
+            <a:spLocks noGrp="1" noRot="1" noChangeAspect="1"/>
+          </p:cNvSpPr>
+          <p:nvPr>
+            <p:ph type="sldImg"/>
+          </p:nvPr>
+        </p:nvSpPr>
+        <p:spPr/>
+      </p:sp>
+      <p:sp>
+        <p:nvSpPr>
+          <p:cNvPr id="3" name="Notes Placeholder 2"/>
+          <p:cNvSpPr>
+            <a:spLocks noGrp="1"/>
+          </p:cNvSpPr>
+          <p:nvPr>
+            <p:ph type="body" idx="1"/>
+          </p:nvPr>
+        </p:nvSpPr>
+        <p:spPr/>
+        <p:txBody>
+          <a:bodyPr/>
+          <a:lstStyle/>
+          <a:p>
+            <a:r>
+              <a:rPr lang="en-US" dirty="0"/>
+              <a:t>Not sure if it would be 100 * cache miss or 117 * cache miss. </a:t>
+            </a:r>
+          </a:p>
+          <a:p>
+            <a:r>
+              <a:rPr lang="en-US" dirty="0"/>
+              <a:t>100 cycles due to DRAM latency + 1 cycle due to bus read request + 16 cycles due to bus bandwidth sending the cache block to the cache</a:t>
+            </a:r>
+          </a:p>
+        </p:txBody>
+      </p:sp>
+      <p:sp>
+        <p:nvSpPr>
+          <p:cNvPr id="4" name="Slide Number Placeholder 3"/>
+          <p:cNvSpPr>
+            <a:spLocks noGrp="1"/>
+          </p:cNvSpPr>
+          <p:nvPr>
+            <p:ph type="sldNum" sz="quarter" idx="5"/>
+          </p:nvPr>
+        </p:nvSpPr>
+        <p:spPr/>
+        <p:txBody>
+          <a:bodyPr/>
+          <a:lstStyle/>
+          <a:p>
+            <a:fld id="{2607865D-A729-4FAA-B6D7-2EF682BBF689}" type="slidenum">
+              <a:rPr lang="ko-KR" altLang="en-US" smtClean="0"/>
+              <a:t>5</a:t>
+            </a:fld>
+            <a:endParaRPr lang="ko-KR" altLang="en-US"/>
+          </a:p>
+        </p:txBody>
+      </p:sp>
+    </p:spTree>
+    <p:extLst>
+      <p:ext uri="{BB962C8B-B14F-4D97-AF65-F5344CB8AC3E}">
+        <p14:creationId xmlns:p14="http://schemas.microsoft.com/office/powerpoint/2010/main" val="801808105"/>
       </p:ext>
     </p:extLst>
   </p:cSld>
@@ -803,7 +905,7 @@
           <a:p>
             <a:fld id="{A00CF5C5-0F2B-4F7A-8484-F6806A9ADAF4}" type="datetimeFigureOut">
               <a:rPr lang="ko-KR" altLang="en-US" smtClean="0"/>
-              <a:t>2024-10-22</a:t>
+              <a:t>2024-10-24</a:t>
             </a:fld>
             <a:endParaRPr lang="ko-KR" altLang="en-US"/>
           </a:p>
@@ -1001,7 +1103,7 @@
           <a:p>
             <a:fld id="{A00CF5C5-0F2B-4F7A-8484-F6806A9ADAF4}" type="datetimeFigureOut">
               <a:rPr lang="ko-KR" altLang="en-US" smtClean="0"/>
-              <a:t>2024-10-22</a:t>
+              <a:t>2024-10-24</a:t>
             </a:fld>
             <a:endParaRPr lang="ko-KR" altLang="en-US"/>
           </a:p>
@@ -1209,7 +1311,7 @@
           <a:p>
             <a:fld id="{A00CF5C5-0F2B-4F7A-8484-F6806A9ADAF4}" type="datetimeFigureOut">
               <a:rPr lang="ko-KR" altLang="en-US" smtClean="0"/>
-              <a:t>2024-10-22</a:t>
+              <a:t>2024-10-24</a:t>
             </a:fld>
             <a:endParaRPr lang="ko-KR" altLang="en-US"/>
           </a:p>
@@ -1407,7 +1509,7 @@
           <a:p>
             <a:fld id="{A00CF5C5-0F2B-4F7A-8484-F6806A9ADAF4}" type="datetimeFigureOut">
               <a:rPr lang="ko-KR" altLang="en-US" smtClean="0"/>
-              <a:t>2024-10-22</a:t>
+              <a:t>2024-10-24</a:t>
             </a:fld>
             <a:endParaRPr lang="ko-KR" altLang="en-US"/>
           </a:p>
@@ -1682,7 +1784,7 @@
           <a:p>
             <a:fld id="{A00CF5C5-0F2B-4F7A-8484-F6806A9ADAF4}" type="datetimeFigureOut">
               <a:rPr lang="ko-KR" altLang="en-US" smtClean="0"/>
-              <a:t>2024-10-22</a:t>
+              <a:t>2024-10-24</a:t>
             </a:fld>
             <a:endParaRPr lang="ko-KR" altLang="en-US"/>
           </a:p>
@@ -1947,7 +2049,7 @@
           <a:p>
             <a:fld id="{A00CF5C5-0F2B-4F7A-8484-F6806A9ADAF4}" type="datetimeFigureOut">
               <a:rPr lang="ko-KR" altLang="en-US" smtClean="0"/>
-              <a:t>2024-10-22</a:t>
+              <a:t>2024-10-24</a:t>
             </a:fld>
             <a:endParaRPr lang="ko-KR" altLang="en-US"/>
           </a:p>
@@ -2359,7 +2461,7 @@
           <a:p>
             <a:fld id="{A00CF5C5-0F2B-4F7A-8484-F6806A9ADAF4}" type="datetimeFigureOut">
               <a:rPr lang="ko-KR" altLang="en-US" smtClean="0"/>
-              <a:t>2024-10-22</a:t>
+              <a:t>2024-10-24</a:t>
             </a:fld>
             <a:endParaRPr lang="ko-KR" altLang="en-US"/>
           </a:p>
@@ -2500,7 +2602,7 @@
           <a:p>
             <a:fld id="{A00CF5C5-0F2B-4F7A-8484-F6806A9ADAF4}" type="datetimeFigureOut">
               <a:rPr lang="ko-KR" altLang="en-US" smtClean="0"/>
-              <a:t>2024-10-22</a:t>
+              <a:t>2024-10-24</a:t>
             </a:fld>
             <a:endParaRPr lang="ko-KR" altLang="en-US"/>
           </a:p>
@@ -2613,7 +2715,7 @@
           <a:p>
             <a:fld id="{A00CF5C5-0F2B-4F7A-8484-F6806A9ADAF4}" type="datetimeFigureOut">
               <a:rPr lang="ko-KR" altLang="en-US" smtClean="0"/>
-              <a:t>2024-10-22</a:t>
+              <a:t>2024-10-24</a:t>
             </a:fld>
             <a:endParaRPr lang="ko-KR" altLang="en-US"/>
           </a:p>
@@ -2924,7 +3026,7 @@
           <a:p>
             <a:fld id="{A00CF5C5-0F2B-4F7A-8484-F6806A9ADAF4}" type="datetimeFigureOut">
               <a:rPr lang="ko-KR" altLang="en-US" smtClean="0"/>
-              <a:t>2024-10-22</a:t>
+              <a:t>2024-10-24</a:t>
             </a:fld>
             <a:endParaRPr lang="ko-KR" altLang="en-US"/>
           </a:p>
@@ -3212,7 +3314,7 @@
           <a:p>
             <a:fld id="{A00CF5C5-0F2B-4F7A-8484-F6806A9ADAF4}" type="datetimeFigureOut">
               <a:rPr lang="ko-KR" altLang="en-US" smtClean="0"/>
-              <a:t>2024-10-22</a:t>
+              <a:t>2024-10-24</a:t>
             </a:fld>
             <a:endParaRPr lang="ko-KR" altLang="en-US"/>
           </a:p>
@@ -3453,7 +3555,7 @@
           <a:p>
             <a:fld id="{A00CF5C5-0F2B-4F7A-8484-F6806A9ADAF4}" type="datetimeFigureOut">
               <a:rPr lang="ko-KR" altLang="en-US" smtClean="0"/>
-              <a:t>2024-10-22</a:t>
+              <a:t>2024-10-24</a:t>
             </a:fld>
             <a:endParaRPr lang="ko-KR" altLang="en-US"/>
           </a:p>

</xml_diff>

<commit_message>
MESI protocol ( store instruction update)
</commit_message>
<xml_diff>
--- a/assignment2/Assignment2.pptx
+++ b/assignment2/Assignment2.pptx
@@ -5,7 +5,7 @@
     <p:sldMasterId id="2147483648" r:id="rId1"/>
   </p:sldMasterIdLst>
   <p:notesMasterIdLst>
-    <p:notesMasterId r:id="rId12"/>
+    <p:notesMasterId r:id="rId21"/>
   </p:notesMasterIdLst>
   <p:sldIdLst>
     <p:sldId id="267" r:id="rId2"/>
@@ -18,6 +18,15 @@
     <p:sldId id="262" r:id="rId9"/>
     <p:sldId id="263" r:id="rId10"/>
     <p:sldId id="265" r:id="rId11"/>
+    <p:sldId id="269" r:id="rId12"/>
+    <p:sldId id="272" r:id="rId13"/>
+    <p:sldId id="274" r:id="rId14"/>
+    <p:sldId id="273" r:id="rId15"/>
+    <p:sldId id="271" r:id="rId16"/>
+    <p:sldId id="277" r:id="rId17"/>
+    <p:sldId id="270" r:id="rId18"/>
+    <p:sldId id="276" r:id="rId19"/>
+    <p:sldId id="275" r:id="rId20"/>
   </p:sldIdLst>
   <p:sldSz cx="12192000" cy="6858000"/>
   <p:notesSz cx="6858000" cy="9144000"/>
@@ -206,7 +215,7 @@
           <a:p>
             <a:fld id="{E0526D6B-6785-48FA-9A0F-025C9B50690D}" type="datetimeFigureOut">
               <a:rPr lang="ko-KR" altLang="en-US" smtClean="0"/>
-              <a:t>2024-10-25</a:t>
+              <a:t>2024-11-17</a:t>
             </a:fld>
             <a:endParaRPr lang="ko-KR" altLang="en-US"/>
           </a:p>
@@ -905,7 +914,7 @@
           <a:p>
             <a:fld id="{A00CF5C5-0F2B-4F7A-8484-F6806A9ADAF4}" type="datetimeFigureOut">
               <a:rPr lang="ko-KR" altLang="en-US" smtClean="0"/>
-              <a:t>2024-10-25</a:t>
+              <a:t>2024-11-17</a:t>
             </a:fld>
             <a:endParaRPr lang="ko-KR" altLang="en-US"/>
           </a:p>
@@ -1103,7 +1112,7 @@
           <a:p>
             <a:fld id="{A00CF5C5-0F2B-4F7A-8484-F6806A9ADAF4}" type="datetimeFigureOut">
               <a:rPr lang="ko-KR" altLang="en-US" smtClean="0"/>
-              <a:t>2024-10-25</a:t>
+              <a:t>2024-11-17</a:t>
             </a:fld>
             <a:endParaRPr lang="ko-KR" altLang="en-US"/>
           </a:p>
@@ -1311,7 +1320,7 @@
           <a:p>
             <a:fld id="{A00CF5C5-0F2B-4F7A-8484-F6806A9ADAF4}" type="datetimeFigureOut">
               <a:rPr lang="ko-KR" altLang="en-US" smtClean="0"/>
-              <a:t>2024-10-25</a:t>
+              <a:t>2024-11-17</a:t>
             </a:fld>
             <a:endParaRPr lang="ko-KR" altLang="en-US"/>
           </a:p>
@@ -1509,7 +1518,7 @@
           <a:p>
             <a:fld id="{A00CF5C5-0F2B-4F7A-8484-F6806A9ADAF4}" type="datetimeFigureOut">
               <a:rPr lang="ko-KR" altLang="en-US" smtClean="0"/>
-              <a:t>2024-10-25</a:t>
+              <a:t>2024-11-17</a:t>
             </a:fld>
             <a:endParaRPr lang="ko-KR" altLang="en-US"/>
           </a:p>
@@ -1784,7 +1793,7 @@
           <a:p>
             <a:fld id="{A00CF5C5-0F2B-4F7A-8484-F6806A9ADAF4}" type="datetimeFigureOut">
               <a:rPr lang="ko-KR" altLang="en-US" smtClean="0"/>
-              <a:t>2024-10-25</a:t>
+              <a:t>2024-11-17</a:t>
             </a:fld>
             <a:endParaRPr lang="ko-KR" altLang="en-US"/>
           </a:p>
@@ -2049,7 +2058,7 @@
           <a:p>
             <a:fld id="{A00CF5C5-0F2B-4F7A-8484-F6806A9ADAF4}" type="datetimeFigureOut">
               <a:rPr lang="ko-KR" altLang="en-US" smtClean="0"/>
-              <a:t>2024-10-25</a:t>
+              <a:t>2024-11-17</a:t>
             </a:fld>
             <a:endParaRPr lang="ko-KR" altLang="en-US"/>
           </a:p>
@@ -2461,7 +2470,7 @@
           <a:p>
             <a:fld id="{A00CF5C5-0F2B-4F7A-8484-F6806A9ADAF4}" type="datetimeFigureOut">
               <a:rPr lang="ko-KR" altLang="en-US" smtClean="0"/>
-              <a:t>2024-10-25</a:t>
+              <a:t>2024-11-17</a:t>
             </a:fld>
             <a:endParaRPr lang="ko-KR" altLang="en-US"/>
           </a:p>
@@ -2602,7 +2611,7 @@
           <a:p>
             <a:fld id="{A00CF5C5-0F2B-4F7A-8484-F6806A9ADAF4}" type="datetimeFigureOut">
               <a:rPr lang="ko-KR" altLang="en-US" smtClean="0"/>
-              <a:t>2024-10-25</a:t>
+              <a:t>2024-11-17</a:t>
             </a:fld>
             <a:endParaRPr lang="ko-KR" altLang="en-US"/>
           </a:p>
@@ -2715,7 +2724,7 @@
           <a:p>
             <a:fld id="{A00CF5C5-0F2B-4F7A-8484-F6806A9ADAF4}" type="datetimeFigureOut">
               <a:rPr lang="ko-KR" altLang="en-US" smtClean="0"/>
-              <a:t>2024-10-25</a:t>
+              <a:t>2024-11-17</a:t>
             </a:fld>
             <a:endParaRPr lang="ko-KR" altLang="en-US"/>
           </a:p>
@@ -3026,7 +3035,7 @@
           <a:p>
             <a:fld id="{A00CF5C5-0F2B-4F7A-8484-F6806A9ADAF4}" type="datetimeFigureOut">
               <a:rPr lang="ko-KR" altLang="en-US" smtClean="0"/>
-              <a:t>2024-10-25</a:t>
+              <a:t>2024-11-17</a:t>
             </a:fld>
             <a:endParaRPr lang="ko-KR" altLang="en-US"/>
           </a:p>
@@ -3314,7 +3323,7 @@
           <a:p>
             <a:fld id="{A00CF5C5-0F2B-4F7A-8484-F6806A9ADAF4}" type="datetimeFigureOut">
               <a:rPr lang="ko-KR" altLang="en-US" smtClean="0"/>
-              <a:t>2024-10-25</a:t>
+              <a:t>2024-11-17</a:t>
             </a:fld>
             <a:endParaRPr lang="ko-KR" altLang="en-US"/>
           </a:p>
@@ -3555,7 +3564,7 @@
           <a:p>
             <a:fld id="{A00CF5C5-0F2B-4F7A-8484-F6806A9ADAF4}" type="datetimeFigureOut">
               <a:rPr lang="ko-KR" altLang="en-US" smtClean="0"/>
-              <a:t>2024-10-25</a:t>
+              <a:t>2024-11-17</a:t>
             </a:fld>
             <a:endParaRPr lang="ko-KR" altLang="en-US"/>
           </a:p>
@@ -4548,6 +4557,1870 @@
 </p:sld>
 </file>
 
+<file path=ppt/slides/slide11.xml><?xml version="1.0" encoding="utf-8"?>
+<p:sld xmlns:a="http://schemas.openxmlformats.org/drawingml/2006/main" xmlns:r="http://schemas.openxmlformats.org/officeDocument/2006/relationships" xmlns:p="http://schemas.openxmlformats.org/presentationml/2006/main">
+  <p:cSld>
+    <p:spTree>
+      <p:nvGrpSpPr>
+        <p:cNvPr id="1" name=""/>
+        <p:cNvGrpSpPr/>
+        <p:nvPr/>
+      </p:nvGrpSpPr>
+      <p:grpSpPr>
+        <a:xfrm>
+          <a:off x="0" y="0"/>
+          <a:ext cx="0" cy="0"/>
+          <a:chOff x="0" y="0"/>
+          <a:chExt cx="0" cy="0"/>
+        </a:xfrm>
+      </p:grpSpPr>
+      <p:sp>
+        <p:nvSpPr>
+          <p:cNvPr id="2" name="제목 1">
+            <a:extLst>
+              <a:ext uri="{FF2B5EF4-FFF2-40B4-BE49-F238E27FC236}">
+                <a16:creationId xmlns:a16="http://schemas.microsoft.com/office/drawing/2014/main" id="{D97A9FA3-4ADC-3538-4B80-D08F4B306098}"/>
+              </a:ext>
+            </a:extLst>
+          </p:cNvPr>
+          <p:cNvSpPr>
+            <a:spLocks noGrp="1"/>
+          </p:cNvSpPr>
+          <p:nvPr>
+            <p:ph type="title"/>
+          </p:nvPr>
+        </p:nvSpPr>
+        <p:spPr/>
+        <p:txBody>
+          <a:bodyPr/>
+          <a:lstStyle/>
+          <a:p>
+            <a:r>
+              <a:rPr lang="en-US" altLang="ko-KR" dirty="0"/>
+              <a:t>Cache coherence protocol</a:t>
+            </a:r>
+            <a:endParaRPr lang="ko-KR" altLang="en-US" dirty="0"/>
+          </a:p>
+        </p:txBody>
+      </p:sp>
+      <p:sp>
+        <p:nvSpPr>
+          <p:cNvPr id="3" name="내용 개체 틀 2">
+            <a:extLst>
+              <a:ext uri="{FF2B5EF4-FFF2-40B4-BE49-F238E27FC236}">
+                <a16:creationId xmlns:a16="http://schemas.microsoft.com/office/drawing/2014/main" id="{7CE37493-DC53-60E8-C3CA-21AD72848EE8}"/>
+              </a:ext>
+            </a:extLst>
+          </p:cNvPr>
+          <p:cNvSpPr>
+            <a:spLocks noGrp="1"/>
+          </p:cNvSpPr>
+          <p:nvPr>
+            <p:ph idx="1"/>
+          </p:nvPr>
+        </p:nvSpPr>
+        <p:spPr/>
+        <p:txBody>
+          <a:bodyPr>
+            <a:normAutofit/>
+          </a:bodyPr>
+          <a:lstStyle/>
+          <a:p>
+            <a:pPr marL="0" indent="0">
+              <a:buNone/>
+            </a:pPr>
+            <a:endParaRPr lang="en-US" altLang="ko-KR" sz="2000" dirty="0"/>
+          </a:p>
+          <a:p>
+            <a:pPr marL="0" indent="0">
+              <a:buNone/>
+            </a:pPr>
+            <a:r>
+              <a:rPr lang="en-US" altLang="ko-KR" sz="2000" dirty="0"/>
+              <a:t>Assuming : we can access cache, bus, dram at one cycle.</a:t>
+            </a:r>
+          </a:p>
+          <a:p>
+            <a:pPr marL="0" indent="0">
+              <a:buNone/>
+            </a:pPr>
+            <a:r>
+              <a:rPr lang="en-US" altLang="ko-KR" sz="2000" dirty="0"/>
+              <a:t>That means. We can check there’s data in cache or other caches or in dram at one cycle. After then, wait the required cycles.</a:t>
+            </a:r>
+          </a:p>
+          <a:p>
+            <a:pPr marL="0" indent="0">
+              <a:buNone/>
+            </a:pPr>
+            <a:endParaRPr lang="en-US" altLang="ko-KR" dirty="0"/>
+          </a:p>
+          <a:p>
+            <a:pPr marL="0" indent="0">
+              <a:buNone/>
+            </a:pPr>
+            <a:r>
+              <a:rPr lang="en-US" altLang="ko-KR" sz="2000" dirty="0"/>
+              <a:t>Cache</a:t>
+            </a:r>
+            <a:r>
+              <a:rPr lang="ko-KR" altLang="en-US" sz="2000" dirty="0"/>
+              <a:t>에 새로운 </a:t>
+            </a:r>
+            <a:r>
+              <a:rPr lang="en-US" altLang="ko-KR" sz="2000" dirty="0"/>
+              <a:t>cache line</a:t>
+            </a:r>
+            <a:r>
+              <a:rPr lang="ko-KR" altLang="en-US" sz="2000" dirty="0"/>
+              <a:t>이 추가되는 경우는 </a:t>
+            </a:r>
+            <a:endParaRPr lang="en-US" altLang="ko-KR" sz="2000" dirty="0"/>
+          </a:p>
+          <a:p>
+            <a:pPr marL="0" indent="0">
+              <a:buNone/>
+            </a:pPr>
+            <a:r>
+              <a:rPr lang="en-US" altLang="ko-KR" sz="2000" dirty="0"/>
+              <a:t>Load</a:t>
+            </a:r>
+            <a:r>
+              <a:rPr lang="ko-KR" altLang="en-US" sz="2000" dirty="0"/>
+              <a:t>시에 기존 캐시에 없던가</a:t>
+            </a:r>
+            <a:r>
+              <a:rPr lang="en-US" altLang="ko-KR" sz="2000" dirty="0"/>
+              <a:t>,</a:t>
+            </a:r>
+          </a:p>
+          <a:p>
+            <a:pPr marL="0" indent="0">
+              <a:buNone/>
+            </a:pPr>
+            <a:r>
+              <a:rPr lang="en-US" altLang="ko-KR" sz="2000" dirty="0"/>
+              <a:t>Store</a:t>
+            </a:r>
+            <a:r>
+              <a:rPr lang="ko-KR" altLang="en-US" sz="2000" dirty="0"/>
+              <a:t>시에 기존 캐시에 없던가 </a:t>
+            </a:r>
+            <a:endParaRPr lang="en-US" altLang="ko-KR" sz="2000" dirty="0"/>
+          </a:p>
+          <a:p>
+            <a:pPr marL="0" indent="0">
+              <a:buNone/>
+            </a:pPr>
+            <a:r>
+              <a:rPr lang="ko-KR" altLang="en-US" sz="2000" dirty="0"/>
+              <a:t>결국 </a:t>
+            </a:r>
+            <a:r>
+              <a:rPr lang="ko-KR" altLang="en-US" sz="2000" dirty="0" err="1"/>
+              <a:t>둘다</a:t>
+            </a:r>
+            <a:r>
+              <a:rPr lang="ko-KR" altLang="en-US" sz="2000" dirty="0"/>
+              <a:t> </a:t>
+            </a:r>
+            <a:r>
+              <a:rPr lang="en-US" altLang="ko-KR" sz="2000" dirty="0"/>
+              <a:t>cache write</a:t>
+            </a:r>
+            <a:r>
+              <a:rPr lang="ko-KR" altLang="en-US" sz="2000" dirty="0"/>
+              <a:t>임 </a:t>
+            </a:r>
+            <a:r>
+              <a:rPr lang="en-US" altLang="ko-KR" sz="2000" dirty="0"/>
+              <a:t>. </a:t>
+            </a:r>
+            <a:r>
+              <a:rPr lang="ko-KR" altLang="en-US" sz="2000" dirty="0" err="1"/>
+              <a:t>기존캐시에</a:t>
+            </a:r>
+            <a:r>
+              <a:rPr lang="ko-KR" altLang="en-US" sz="2000" dirty="0"/>
+              <a:t> 없다는 것은 </a:t>
+            </a:r>
+            <a:r>
+              <a:rPr lang="en-US" altLang="ko-KR" sz="2000" dirty="0"/>
+              <a:t>cache hit</a:t>
+            </a:r>
+            <a:r>
+              <a:rPr lang="ko-KR" altLang="en-US" sz="2000" dirty="0"/>
+              <a:t>를 체크하고</a:t>
+            </a:r>
+            <a:r>
+              <a:rPr lang="en-US" altLang="ko-KR" sz="2000" dirty="0"/>
+              <a:t>, </a:t>
+            </a:r>
+            <a:r>
+              <a:rPr lang="ko-KR" altLang="en-US" sz="2000" dirty="0"/>
+              <a:t>다른 </a:t>
+            </a:r>
+            <a:r>
+              <a:rPr lang="en-US" altLang="ko-KR" sz="2000" dirty="0"/>
+              <a:t>cache</a:t>
+            </a:r>
+            <a:r>
+              <a:rPr lang="ko-KR" altLang="en-US" sz="2000" dirty="0"/>
+              <a:t>에 </a:t>
+            </a:r>
+            <a:r>
+              <a:rPr lang="en-US" altLang="ko-KR" sz="2000" dirty="0"/>
+              <a:t>access</a:t>
+            </a:r>
+            <a:r>
+              <a:rPr lang="ko-KR" altLang="en-US" sz="2000" dirty="0"/>
+              <a:t>를 </a:t>
+            </a:r>
+            <a:r>
+              <a:rPr lang="ko-KR" altLang="en-US" sz="2000" dirty="0" err="1"/>
+              <a:t>해봐야함</a:t>
+            </a:r>
+            <a:r>
+              <a:rPr lang="en-US" altLang="ko-KR" sz="2000" dirty="0"/>
+              <a:t>.</a:t>
+            </a:r>
+          </a:p>
+          <a:p>
+            <a:pPr marL="0" indent="0">
+              <a:buNone/>
+            </a:pPr>
+            <a:r>
+              <a:rPr lang="ko-KR" altLang="en-US" sz="2000" dirty="0"/>
+              <a:t>기존 캐시에 있던 게 바뀌는 경우는</a:t>
+            </a:r>
+            <a:r>
+              <a:rPr lang="en-US" altLang="ko-KR" sz="2000" dirty="0"/>
+              <a:t>? Store </a:t>
+            </a:r>
+            <a:r>
+              <a:rPr lang="ko-KR" altLang="en-US" sz="2000" dirty="0"/>
+              <a:t>뿐이다</a:t>
+            </a:r>
+            <a:r>
+              <a:rPr lang="en-US" altLang="ko-KR" sz="2000" dirty="0"/>
+              <a:t>. label</a:t>
+            </a:r>
+          </a:p>
+          <a:p>
+            <a:pPr marL="0" indent="0">
+              <a:buNone/>
+            </a:pPr>
+            <a:endParaRPr lang="en-US" altLang="ko-KR" dirty="0"/>
+          </a:p>
+        </p:txBody>
+      </p:sp>
+    </p:spTree>
+    <p:extLst>
+      <p:ext uri="{BB962C8B-B14F-4D97-AF65-F5344CB8AC3E}">
+        <p14:creationId xmlns:p14="http://schemas.microsoft.com/office/powerpoint/2010/main" val="2651666689"/>
+      </p:ext>
+    </p:extLst>
+  </p:cSld>
+  <p:clrMapOvr>
+    <a:masterClrMapping/>
+  </p:clrMapOvr>
+</p:sld>
+</file>
+
+<file path=ppt/slides/slide12.xml><?xml version="1.0" encoding="utf-8"?>
+<p:sld xmlns:a="http://schemas.openxmlformats.org/drawingml/2006/main" xmlns:r="http://schemas.openxmlformats.org/officeDocument/2006/relationships" xmlns:p="http://schemas.openxmlformats.org/presentationml/2006/main">
+  <p:cSld>
+    <p:spTree>
+      <p:nvGrpSpPr>
+        <p:cNvPr id="1" name="">
+          <a:extLst>
+            <a:ext uri="{FF2B5EF4-FFF2-40B4-BE49-F238E27FC236}">
+              <a16:creationId xmlns:a16="http://schemas.microsoft.com/office/drawing/2014/main" id="{CDC83FE6-3C6F-4984-273A-D7B6CAA84674}"/>
+            </a:ext>
+          </a:extLst>
+        </p:cNvPr>
+        <p:cNvGrpSpPr/>
+        <p:nvPr/>
+      </p:nvGrpSpPr>
+      <p:grpSpPr>
+        <a:xfrm>
+          <a:off x="0" y="0"/>
+          <a:ext cx="0" cy="0"/>
+          <a:chOff x="0" y="0"/>
+          <a:chExt cx="0" cy="0"/>
+        </a:xfrm>
+      </p:grpSpPr>
+      <p:sp>
+        <p:nvSpPr>
+          <p:cNvPr id="2" name="제목 1">
+            <a:extLst>
+              <a:ext uri="{FF2B5EF4-FFF2-40B4-BE49-F238E27FC236}">
+                <a16:creationId xmlns:a16="http://schemas.microsoft.com/office/drawing/2014/main" id="{503CDA9C-1A2F-12CB-5990-A6D723151E39}"/>
+              </a:ext>
+            </a:extLst>
+          </p:cNvPr>
+          <p:cNvSpPr>
+            <a:spLocks noGrp="1"/>
+          </p:cNvSpPr>
+          <p:nvPr>
+            <p:ph type="title"/>
+          </p:nvPr>
+        </p:nvSpPr>
+        <p:spPr/>
+        <p:txBody>
+          <a:bodyPr/>
+          <a:lstStyle/>
+          <a:p>
+            <a:r>
+              <a:rPr lang="en-US" altLang="ko-KR" dirty="0"/>
+              <a:t>Cache coherence protocol</a:t>
+            </a:r>
+            <a:endParaRPr lang="ko-KR" altLang="en-US" dirty="0"/>
+          </a:p>
+        </p:txBody>
+      </p:sp>
+      <p:sp>
+        <p:nvSpPr>
+          <p:cNvPr id="3" name="내용 개체 틀 2">
+            <a:extLst>
+              <a:ext uri="{FF2B5EF4-FFF2-40B4-BE49-F238E27FC236}">
+                <a16:creationId xmlns:a16="http://schemas.microsoft.com/office/drawing/2014/main" id="{6876FACD-7AB9-5855-6869-1EC21BE25024}"/>
+              </a:ext>
+            </a:extLst>
+          </p:cNvPr>
+          <p:cNvSpPr>
+            <a:spLocks noGrp="1"/>
+          </p:cNvSpPr>
+          <p:nvPr>
+            <p:ph idx="1"/>
+          </p:nvPr>
+        </p:nvSpPr>
+        <p:spPr/>
+        <p:txBody>
+          <a:bodyPr>
+            <a:normAutofit/>
+          </a:bodyPr>
+          <a:lstStyle/>
+          <a:p>
+            <a:pPr marL="0" indent="0">
+              <a:buNone/>
+            </a:pPr>
+            <a:r>
+              <a:rPr lang="en-US" altLang="ko-KR" sz="2000" b="1" dirty="0"/>
+              <a:t>BUS read</a:t>
+            </a:r>
+          </a:p>
+          <a:p>
+            <a:pPr marL="0" indent="0">
+              <a:buNone/>
+            </a:pPr>
+            <a:r>
+              <a:rPr lang="en-US" altLang="ko-KR" sz="1800" dirty="0"/>
+              <a:t>If cache 1 is M-state or E-state -&gt; other cache have all invalid data.(I-state)</a:t>
+            </a:r>
+          </a:p>
+          <a:p>
+            <a:pPr marL="0" indent="0">
+              <a:buNone/>
+            </a:pPr>
+            <a:r>
+              <a:rPr lang="en-US" altLang="ko-KR" sz="1800" dirty="0"/>
+              <a:t>-&gt; No other cache access and keep the state.</a:t>
+            </a:r>
+          </a:p>
+          <a:p>
+            <a:pPr marL="0" indent="0">
+              <a:buNone/>
+            </a:pPr>
+            <a:r>
+              <a:rPr lang="en-US" altLang="ko-KR" sz="1800" dirty="0"/>
+              <a:t>If cache 1 is S-state -&gt; a cache have S-state -&gt; it would make cache1 to S-state</a:t>
+            </a:r>
+          </a:p>
+          <a:p>
+            <a:pPr marL="0" indent="0">
+              <a:buNone/>
+            </a:pPr>
+            <a:r>
+              <a:rPr lang="en-US" altLang="ko-KR" sz="1800" dirty="0"/>
+              <a:t>		      -&gt; </a:t>
+            </a:r>
+          </a:p>
+          <a:p>
+            <a:pPr marL="0" indent="0">
+              <a:buNone/>
+            </a:pPr>
+            <a:r>
+              <a:rPr lang="en-US" altLang="ko-KR" sz="1800" dirty="0"/>
+              <a:t>If cache 1 is I-state -&gt; 1) a cache has that data   -&gt; change cache1 and that cache to S-state  </a:t>
+            </a:r>
+          </a:p>
+          <a:p>
+            <a:pPr marL="0" indent="0">
+              <a:buNone/>
+            </a:pPr>
+            <a:r>
+              <a:rPr lang="en-US" altLang="ko-KR" sz="1800" dirty="0"/>
+              <a:t>		     -&gt; 2) no cache has that data -&gt; change cache 1 to E-state</a:t>
+            </a:r>
+          </a:p>
+          <a:p>
+            <a:pPr marL="0" indent="0">
+              <a:buNone/>
+            </a:pPr>
+            <a:r>
+              <a:rPr lang="en-US" altLang="ko-KR" sz="1800" b="1" dirty="0"/>
+              <a:t>BUS write</a:t>
+            </a:r>
+          </a:p>
+          <a:p>
+            <a:pPr marL="0" indent="0">
+              <a:buNone/>
+            </a:pPr>
+            <a:r>
+              <a:rPr lang="en-US" altLang="ko-KR" sz="1800" dirty="0"/>
+              <a:t>Change cache 1 to M-state.</a:t>
+            </a:r>
+          </a:p>
+          <a:p>
+            <a:pPr marL="0" indent="0">
+              <a:buNone/>
+            </a:pPr>
+            <a:r>
+              <a:rPr lang="en-US" altLang="ko-KR" sz="1800" dirty="0"/>
+              <a:t>Change all other caches to I-state. If they have same address.</a:t>
+            </a:r>
+          </a:p>
+          <a:p>
+            <a:pPr marL="0" indent="0">
+              <a:buNone/>
+            </a:pPr>
+            <a:endParaRPr lang="en-US" altLang="ko-KR" sz="1600" dirty="0"/>
+          </a:p>
+          <a:p>
+            <a:pPr marL="0" indent="0">
+              <a:buNone/>
+            </a:pPr>
+            <a:endParaRPr lang="en-US" altLang="ko-KR" sz="1800" dirty="0"/>
+          </a:p>
+          <a:p>
+            <a:pPr marL="0" indent="0">
+              <a:buNone/>
+            </a:pPr>
+            <a:endParaRPr lang="en-US" altLang="ko-KR" sz="1800" dirty="0"/>
+          </a:p>
+          <a:p>
+            <a:pPr marL="0" indent="0">
+              <a:buNone/>
+            </a:pPr>
+            <a:endParaRPr lang="en-US" altLang="ko-KR" sz="1800" dirty="0"/>
+          </a:p>
+          <a:p>
+            <a:pPr marL="0" indent="0">
+              <a:buNone/>
+            </a:pPr>
+            <a:endParaRPr lang="en-US" altLang="ko-KR" sz="1800" dirty="0"/>
+          </a:p>
+          <a:p>
+            <a:pPr marL="0" indent="0">
+              <a:buNone/>
+            </a:pPr>
+            <a:endParaRPr lang="en-US" altLang="ko-KR" sz="2000" dirty="0"/>
+          </a:p>
+          <a:p>
+            <a:pPr marL="0" indent="0">
+              <a:buNone/>
+            </a:pPr>
+            <a:endParaRPr lang="en-US" altLang="ko-KR" dirty="0"/>
+          </a:p>
+        </p:txBody>
+      </p:sp>
+    </p:spTree>
+    <p:extLst>
+      <p:ext uri="{BB962C8B-B14F-4D97-AF65-F5344CB8AC3E}">
+        <p14:creationId xmlns:p14="http://schemas.microsoft.com/office/powerpoint/2010/main" val="2369220999"/>
+      </p:ext>
+    </p:extLst>
+  </p:cSld>
+  <p:clrMapOvr>
+    <a:masterClrMapping/>
+  </p:clrMapOvr>
+</p:sld>
+</file>
+
+<file path=ppt/slides/slide13.xml><?xml version="1.0" encoding="utf-8"?>
+<p:sld xmlns:a="http://schemas.openxmlformats.org/drawingml/2006/main" xmlns:r="http://schemas.openxmlformats.org/officeDocument/2006/relationships" xmlns:p="http://schemas.openxmlformats.org/presentationml/2006/main">
+  <p:cSld>
+    <p:spTree>
+      <p:nvGrpSpPr>
+        <p:cNvPr id="1" name="">
+          <a:extLst>
+            <a:ext uri="{FF2B5EF4-FFF2-40B4-BE49-F238E27FC236}">
+              <a16:creationId xmlns:a16="http://schemas.microsoft.com/office/drawing/2014/main" id="{7F4F6278-BB85-CD2B-65DF-C0761C939C3D}"/>
+            </a:ext>
+          </a:extLst>
+        </p:cNvPr>
+        <p:cNvGrpSpPr/>
+        <p:nvPr/>
+      </p:nvGrpSpPr>
+      <p:grpSpPr>
+        <a:xfrm>
+          <a:off x="0" y="0"/>
+          <a:ext cx="0" cy="0"/>
+          <a:chOff x="0" y="0"/>
+          <a:chExt cx="0" cy="0"/>
+        </a:xfrm>
+      </p:grpSpPr>
+      <p:sp>
+        <p:nvSpPr>
+          <p:cNvPr id="2" name="제목 1">
+            <a:extLst>
+              <a:ext uri="{FF2B5EF4-FFF2-40B4-BE49-F238E27FC236}">
+                <a16:creationId xmlns:a16="http://schemas.microsoft.com/office/drawing/2014/main" id="{EF98A1CD-4345-6064-D81A-98299747825E}"/>
+              </a:ext>
+            </a:extLst>
+          </p:cNvPr>
+          <p:cNvSpPr>
+            <a:spLocks noGrp="1"/>
+          </p:cNvSpPr>
+          <p:nvPr>
+            <p:ph type="title"/>
+          </p:nvPr>
+        </p:nvSpPr>
+        <p:spPr/>
+        <p:txBody>
+          <a:bodyPr/>
+          <a:lstStyle/>
+          <a:p>
+            <a:r>
+              <a:rPr lang="en-US" altLang="ko-KR" dirty="0"/>
+              <a:t>Cache coherence protocol</a:t>
+            </a:r>
+            <a:endParaRPr lang="ko-KR" altLang="en-US" dirty="0"/>
+          </a:p>
+        </p:txBody>
+      </p:sp>
+      <p:sp>
+        <p:nvSpPr>
+          <p:cNvPr id="3" name="내용 개체 틀 2">
+            <a:extLst>
+              <a:ext uri="{FF2B5EF4-FFF2-40B4-BE49-F238E27FC236}">
+                <a16:creationId xmlns:a16="http://schemas.microsoft.com/office/drawing/2014/main" id="{A43B6873-F6D1-4C85-028D-1B941B995432}"/>
+              </a:ext>
+            </a:extLst>
+          </p:cNvPr>
+          <p:cNvSpPr>
+            <a:spLocks noGrp="1"/>
+          </p:cNvSpPr>
+          <p:nvPr>
+            <p:ph idx="1"/>
+          </p:nvPr>
+        </p:nvSpPr>
+        <p:spPr/>
+        <p:txBody>
+          <a:bodyPr>
+            <a:normAutofit fontScale="92500" lnSpcReduction="20000"/>
+          </a:bodyPr>
+          <a:lstStyle/>
+          <a:p>
+            <a:pPr marL="0" indent="0">
+              <a:buNone/>
+            </a:pPr>
+            <a:r>
+              <a:rPr lang="en-US" altLang="ko-KR" sz="1800" b="1" dirty="0"/>
+              <a:t>BUS write</a:t>
+            </a:r>
+          </a:p>
+          <a:p>
+            <a:pPr marL="0" indent="0">
+              <a:buNone/>
+            </a:pPr>
+            <a:r>
+              <a:rPr lang="en-US" altLang="ko-KR" sz="1800" dirty="0"/>
+              <a:t>Change cache 1 to M-state.</a:t>
+            </a:r>
+          </a:p>
+          <a:p>
+            <a:pPr marL="0" indent="0">
+              <a:buNone/>
+            </a:pPr>
+            <a:r>
+              <a:rPr lang="en-US" altLang="ko-KR" sz="1800" dirty="0"/>
+              <a:t>Change all other caches to I-state. even If they have same address.</a:t>
+            </a:r>
+          </a:p>
+          <a:p>
+            <a:pPr>
+              <a:buFont typeface="Wingdings" panose="05000000000000000000" pitchFamily="2" charset="2"/>
+              <a:buChar char="è"/>
+            </a:pPr>
+            <a:r>
+              <a:rPr lang="en-US" altLang="ko-KR" sz="1800" dirty="0"/>
+              <a:t>Cache</a:t>
+            </a:r>
+            <a:r>
+              <a:rPr lang="ko-KR" altLang="en-US" sz="1800" dirty="0"/>
+              <a:t>에 메모리를 가져와서 쓰는 형식</a:t>
+            </a:r>
+            <a:r>
+              <a:rPr lang="en-US" altLang="ko-KR" sz="1800" dirty="0"/>
+              <a:t>. Write</a:t>
+            </a:r>
+            <a:r>
+              <a:rPr lang="ko-KR" altLang="en-US" sz="1800" dirty="0"/>
+              <a:t> </a:t>
+            </a:r>
+            <a:r>
+              <a:rPr lang="en-US" altLang="ko-KR" sz="1800" dirty="0"/>
+              <a:t>allocate.</a:t>
+            </a:r>
+          </a:p>
+          <a:p>
+            <a:pPr marL="0" indent="0">
+              <a:buNone/>
+            </a:pPr>
+            <a:endParaRPr lang="en-US" altLang="ko-KR" sz="1800" dirty="0"/>
+          </a:p>
+          <a:p>
+            <a:pPr marL="0" indent="0">
+              <a:buNone/>
+            </a:pPr>
+            <a:endParaRPr lang="en-US" altLang="ko-KR" sz="1800" dirty="0"/>
+          </a:p>
+          <a:p>
+            <a:pPr marL="0" indent="0">
+              <a:buNone/>
+            </a:pPr>
+            <a:r>
+              <a:rPr lang="en-US" altLang="ko-KR" sz="1600" dirty="0"/>
+              <a:t>“</a:t>
+            </a:r>
+            <a:r>
+              <a:rPr lang="en-US" altLang="ko-KR" sz="1600" dirty="0" err="1"/>
+              <a:t>Bus_invalid</a:t>
+            </a:r>
+            <a:r>
+              <a:rPr lang="en-US" altLang="ko-KR" sz="1600" dirty="0"/>
+              <a:t>” function. If there’s same cache line  in other caches. Make it invalid and put it on last of LRU position</a:t>
+            </a:r>
+          </a:p>
+          <a:p>
+            <a:pPr marL="0" indent="0">
+              <a:buNone/>
+            </a:pPr>
+            <a:endParaRPr lang="en-US" altLang="ko-KR" sz="1800" dirty="0"/>
+          </a:p>
+          <a:p>
+            <a:pPr marL="0" indent="0">
+              <a:buNone/>
+            </a:pPr>
+            <a:r>
+              <a:rPr lang="ko-KR" altLang="en-US" sz="1800" dirty="0"/>
+              <a:t>메모리 </a:t>
+            </a:r>
+            <a:r>
+              <a:rPr lang="en-US" altLang="ko-KR" sz="1800" dirty="0"/>
+              <a:t>load -&gt; </a:t>
+            </a:r>
+            <a:r>
+              <a:rPr lang="ko-KR" altLang="en-US" sz="1800" dirty="0"/>
+              <a:t>그 메모리에 있는 것을 불러옴 </a:t>
+            </a:r>
+            <a:r>
+              <a:rPr lang="en-US" altLang="ko-KR" sz="1800" dirty="0"/>
+              <a:t>-&gt; cache</a:t>
+            </a:r>
+            <a:r>
+              <a:rPr lang="ko-KR" altLang="en-US" sz="1800" dirty="0"/>
+              <a:t>에 </a:t>
+            </a:r>
+            <a:r>
+              <a:rPr lang="ko-KR" altLang="en-US" sz="1800" dirty="0" err="1"/>
+              <a:t>쓰는게</a:t>
+            </a:r>
+            <a:r>
+              <a:rPr lang="ko-KR" altLang="en-US" sz="1800" dirty="0"/>
+              <a:t> 아니고 그저 불러오는 것</a:t>
+            </a:r>
+            <a:r>
+              <a:rPr lang="en-US" altLang="ko-KR" sz="1800" dirty="0"/>
+              <a:t>…!</a:t>
+            </a:r>
+          </a:p>
+          <a:p>
+            <a:pPr marL="0" indent="0">
+              <a:buNone/>
+            </a:pPr>
+            <a:r>
+              <a:rPr lang="ko-KR" altLang="en-US" sz="1800" dirty="0"/>
+              <a:t>메모리 </a:t>
+            </a:r>
+            <a:r>
+              <a:rPr lang="en-US" altLang="ko-KR" sz="1800" dirty="0"/>
+              <a:t>store -&gt; </a:t>
+            </a:r>
+            <a:r>
+              <a:rPr lang="ko-KR" altLang="en-US" sz="1800" dirty="0"/>
+              <a:t>그 메모리에 </a:t>
+            </a:r>
+            <a:r>
+              <a:rPr lang="ko-KR" altLang="en-US" sz="1800" dirty="0" err="1"/>
+              <a:t>써야함</a:t>
+            </a:r>
+            <a:r>
+              <a:rPr lang="ko-KR" altLang="en-US" sz="1800" dirty="0"/>
+              <a:t> </a:t>
+            </a:r>
+            <a:r>
+              <a:rPr lang="en-US" altLang="ko-KR" sz="1800" dirty="0"/>
+              <a:t>-&gt; cache</a:t>
+            </a:r>
+            <a:r>
+              <a:rPr lang="ko-KR" altLang="en-US" sz="1800" dirty="0"/>
+              <a:t>에 </a:t>
+            </a:r>
+            <a:r>
+              <a:rPr lang="ko-KR" altLang="en-US" sz="1800" dirty="0" err="1"/>
+              <a:t>있던거를</a:t>
+            </a:r>
+            <a:r>
+              <a:rPr lang="ko-KR" altLang="en-US" sz="1800" dirty="0"/>
+              <a:t> </a:t>
+            </a:r>
+            <a:r>
+              <a:rPr lang="ko-KR" altLang="en-US" sz="1800" dirty="0" err="1"/>
+              <a:t>읽는거임</a:t>
+            </a:r>
+            <a:r>
+              <a:rPr lang="ko-KR" altLang="en-US" sz="1800" dirty="0"/>
+              <a:t> </a:t>
+            </a:r>
+            <a:r>
+              <a:rPr lang="en-US" altLang="ko-KR" sz="1800" dirty="0"/>
+              <a:t>write-back</a:t>
+            </a:r>
+            <a:r>
+              <a:rPr lang="ko-KR" altLang="en-US" sz="1800" dirty="0"/>
+              <a:t>을 이용</a:t>
+            </a:r>
+            <a:r>
+              <a:rPr lang="en-US" altLang="ko-KR" sz="1800" dirty="0"/>
+              <a:t> cache</a:t>
+            </a:r>
+            <a:r>
+              <a:rPr lang="ko-KR" altLang="en-US" sz="1800" dirty="0"/>
+              <a:t>에 있으면 </a:t>
+            </a:r>
+            <a:r>
+              <a:rPr lang="en-US" altLang="ko-KR" sz="1800" dirty="0"/>
+              <a:t>cache</a:t>
+            </a:r>
+            <a:r>
+              <a:rPr lang="ko-KR" altLang="en-US" sz="1800" dirty="0"/>
+              <a:t>에 </a:t>
+            </a:r>
+            <a:r>
+              <a:rPr lang="ko-KR" altLang="en-US" sz="1800" dirty="0" err="1"/>
+              <a:t>써야함</a:t>
+            </a:r>
+            <a:r>
+              <a:rPr lang="en-US" altLang="ko-KR" sz="1800" dirty="0"/>
+              <a:t>. </a:t>
+            </a:r>
+            <a:r>
+              <a:rPr lang="ko-KR" altLang="en-US" sz="1800" dirty="0"/>
+              <a:t>이는 </a:t>
+            </a:r>
+            <a:r>
+              <a:rPr lang="en-US" altLang="ko-KR" sz="1800" dirty="0"/>
+              <a:t>target cycle</a:t>
+            </a:r>
+            <a:r>
+              <a:rPr lang="ko-KR" altLang="en-US" sz="1800" dirty="0"/>
+              <a:t>에 </a:t>
+            </a:r>
+            <a:r>
+              <a:rPr lang="en-US" altLang="ko-KR" sz="1800" dirty="0"/>
+              <a:t>100</a:t>
+            </a:r>
+            <a:r>
+              <a:rPr lang="ko-KR" altLang="en-US" sz="1800" dirty="0"/>
+              <a:t>을 추가하면 됨</a:t>
+            </a:r>
+            <a:r>
+              <a:rPr lang="en-US" altLang="ko-KR" sz="1800" dirty="0"/>
+              <a:t>. </a:t>
+            </a:r>
+          </a:p>
+          <a:p>
+            <a:pPr marL="0" indent="0">
+              <a:buNone/>
+            </a:pPr>
+            <a:endParaRPr lang="en-US" altLang="ko-KR" sz="1800" dirty="0"/>
+          </a:p>
+          <a:p>
+            <a:pPr marL="0" indent="0">
+              <a:buNone/>
+            </a:pPr>
+            <a:r>
+              <a:rPr lang="en-US" altLang="ko-KR" sz="1800" dirty="0"/>
+              <a:t>Cache write </a:t>
+            </a:r>
+            <a:r>
+              <a:rPr lang="ko-KR" altLang="en-US" sz="1800" dirty="0"/>
+              <a:t>시에 다른 </a:t>
+            </a:r>
+            <a:r>
+              <a:rPr lang="en-US" altLang="ko-KR" sz="1800" dirty="0"/>
+              <a:t>cache</a:t>
+            </a:r>
+            <a:r>
+              <a:rPr lang="ko-KR" altLang="en-US" sz="1800" dirty="0"/>
+              <a:t>에는 존재하지만 본인 </a:t>
+            </a:r>
+            <a:r>
+              <a:rPr lang="en-US" altLang="ko-KR" sz="1800" dirty="0"/>
+              <a:t>cache</a:t>
+            </a:r>
+            <a:r>
+              <a:rPr lang="ko-KR" altLang="en-US" sz="1800" dirty="0"/>
+              <a:t>에 존재하지 </a:t>
+            </a:r>
+            <a:r>
+              <a:rPr lang="ko-KR" altLang="en-US" sz="1800" dirty="0" err="1"/>
+              <a:t>않을때</a:t>
+            </a:r>
+            <a:r>
+              <a:rPr lang="en-US" altLang="ko-KR" sz="1800" dirty="0"/>
+              <a:t>? </a:t>
+            </a:r>
+            <a:r>
+              <a:rPr lang="ko-KR" altLang="en-US" sz="1800" dirty="0"/>
+              <a:t>다른 </a:t>
+            </a:r>
+            <a:r>
+              <a:rPr lang="en-US" altLang="ko-KR" sz="1800" dirty="0"/>
+              <a:t>cache</a:t>
+            </a:r>
+            <a:r>
+              <a:rPr lang="ko-KR" altLang="en-US" sz="1800" dirty="0"/>
+              <a:t>에 쓰면 될 것 같음</a:t>
+            </a:r>
+            <a:r>
+              <a:rPr lang="en-US" altLang="ko-KR" sz="1800" dirty="0"/>
+              <a:t>. -&gt; No</a:t>
+            </a:r>
+            <a:r>
+              <a:rPr lang="ko-KR" altLang="en-US" sz="1800" dirty="0"/>
+              <a:t> 그냥 본인에게 쓰고 </a:t>
+            </a:r>
+            <a:r>
+              <a:rPr lang="ko-KR" altLang="en-US" sz="1800" dirty="0" err="1"/>
+              <a:t>다른애들</a:t>
+            </a:r>
+            <a:r>
+              <a:rPr lang="ko-KR" altLang="en-US" sz="1800" dirty="0"/>
+              <a:t> </a:t>
+            </a:r>
+            <a:r>
+              <a:rPr lang="en-US" altLang="ko-KR" sz="1800" dirty="0"/>
+              <a:t>invalid</a:t>
+            </a:r>
+            <a:r>
+              <a:rPr lang="ko-KR" altLang="en-US" sz="1800" dirty="0"/>
+              <a:t>만들기 </a:t>
+            </a:r>
+            <a:r>
+              <a:rPr lang="en-US" altLang="ko-KR" sz="1800" dirty="0"/>
+              <a:t>.</a:t>
+            </a:r>
+          </a:p>
+          <a:p>
+            <a:pPr marL="0" indent="0">
+              <a:buNone/>
+            </a:pPr>
+            <a:endParaRPr lang="en-US" altLang="ko-KR" sz="1800" dirty="0"/>
+          </a:p>
+          <a:p>
+            <a:pPr marL="0" indent="0">
+              <a:buNone/>
+            </a:pPr>
+            <a:endParaRPr lang="en-US" altLang="ko-KR" sz="1800" dirty="0"/>
+          </a:p>
+          <a:p>
+            <a:pPr marL="0" indent="0">
+              <a:buNone/>
+            </a:pPr>
+            <a:endParaRPr lang="en-US" altLang="ko-KR" sz="2000" dirty="0"/>
+          </a:p>
+          <a:p>
+            <a:pPr marL="0" indent="0">
+              <a:buNone/>
+            </a:pPr>
+            <a:endParaRPr lang="en-US" altLang="ko-KR" dirty="0"/>
+          </a:p>
+        </p:txBody>
+      </p:sp>
+    </p:spTree>
+    <p:extLst>
+      <p:ext uri="{BB962C8B-B14F-4D97-AF65-F5344CB8AC3E}">
+        <p14:creationId xmlns:p14="http://schemas.microsoft.com/office/powerpoint/2010/main" val="357758730"/>
+      </p:ext>
+    </p:extLst>
+  </p:cSld>
+  <p:clrMapOvr>
+    <a:masterClrMapping/>
+  </p:clrMapOvr>
+</p:sld>
+</file>
+
+<file path=ppt/slides/slide14.xml><?xml version="1.0" encoding="utf-8"?>
+<p:sld xmlns:a="http://schemas.openxmlformats.org/drawingml/2006/main" xmlns:r="http://schemas.openxmlformats.org/officeDocument/2006/relationships" xmlns:p="http://schemas.openxmlformats.org/presentationml/2006/main">
+  <p:cSld>
+    <p:spTree>
+      <p:nvGrpSpPr>
+        <p:cNvPr id="1" name="">
+          <a:extLst>
+            <a:ext uri="{FF2B5EF4-FFF2-40B4-BE49-F238E27FC236}">
+              <a16:creationId xmlns:a16="http://schemas.microsoft.com/office/drawing/2014/main" id="{D4581FD2-4F5F-15C5-9A36-F4A03FFE15C5}"/>
+            </a:ext>
+          </a:extLst>
+        </p:cNvPr>
+        <p:cNvGrpSpPr/>
+        <p:nvPr/>
+      </p:nvGrpSpPr>
+      <p:grpSpPr>
+        <a:xfrm>
+          <a:off x="0" y="0"/>
+          <a:ext cx="0" cy="0"/>
+          <a:chOff x="0" y="0"/>
+          <a:chExt cx="0" cy="0"/>
+        </a:xfrm>
+      </p:grpSpPr>
+      <p:sp>
+        <p:nvSpPr>
+          <p:cNvPr id="2" name="제목 1">
+            <a:extLst>
+              <a:ext uri="{FF2B5EF4-FFF2-40B4-BE49-F238E27FC236}">
+                <a16:creationId xmlns:a16="http://schemas.microsoft.com/office/drawing/2014/main" id="{627D8F2D-6087-F23F-1CFA-51C38193356C}"/>
+              </a:ext>
+            </a:extLst>
+          </p:cNvPr>
+          <p:cNvSpPr>
+            <a:spLocks noGrp="1"/>
+          </p:cNvSpPr>
+          <p:nvPr>
+            <p:ph type="title"/>
+          </p:nvPr>
+        </p:nvSpPr>
+        <p:spPr/>
+        <p:txBody>
+          <a:bodyPr/>
+          <a:lstStyle/>
+          <a:p>
+            <a:r>
+              <a:rPr lang="en-US" altLang="ko-KR" dirty="0"/>
+              <a:t>Cache coherence protocol</a:t>
+            </a:r>
+            <a:endParaRPr lang="ko-KR" altLang="en-US" dirty="0"/>
+          </a:p>
+        </p:txBody>
+      </p:sp>
+      <p:sp>
+        <p:nvSpPr>
+          <p:cNvPr id="3" name="내용 개체 틀 2">
+            <a:extLst>
+              <a:ext uri="{FF2B5EF4-FFF2-40B4-BE49-F238E27FC236}">
+                <a16:creationId xmlns:a16="http://schemas.microsoft.com/office/drawing/2014/main" id="{819BB185-35E3-812B-6BD7-4C450317011C}"/>
+              </a:ext>
+            </a:extLst>
+          </p:cNvPr>
+          <p:cNvSpPr>
+            <a:spLocks noGrp="1"/>
+          </p:cNvSpPr>
+          <p:nvPr>
+            <p:ph idx="1"/>
+          </p:nvPr>
+        </p:nvSpPr>
+        <p:spPr/>
+        <p:txBody>
+          <a:bodyPr>
+            <a:normAutofit/>
+          </a:bodyPr>
+          <a:lstStyle/>
+          <a:p>
+            <a:pPr marL="0" indent="0">
+              <a:buNone/>
+            </a:pPr>
+            <a:r>
+              <a:rPr lang="en-US" altLang="ko-KR" sz="2000" b="1" dirty="0"/>
+              <a:t>BUS write</a:t>
+            </a:r>
+          </a:p>
+          <a:p>
+            <a:pPr marL="0" indent="0">
+              <a:buNone/>
+            </a:pPr>
+            <a:r>
+              <a:rPr lang="en-US" altLang="ko-KR" sz="2000" dirty="0"/>
+              <a:t>Change cache 1 to M-state.</a:t>
+            </a:r>
+          </a:p>
+          <a:p>
+            <a:pPr marL="0" indent="0">
+              <a:buNone/>
+            </a:pPr>
+            <a:r>
+              <a:rPr lang="en-US" altLang="ko-KR" sz="2000" dirty="0"/>
+              <a:t>Change all other caches to I-state. If they have same address.</a:t>
+            </a:r>
+          </a:p>
+          <a:p>
+            <a:pPr marL="0" indent="0">
+              <a:buNone/>
+            </a:pPr>
+            <a:endParaRPr lang="en-US" altLang="ko-KR" sz="1800" dirty="0"/>
+          </a:p>
+          <a:p>
+            <a:pPr marL="0" indent="0">
+              <a:buNone/>
+            </a:pPr>
+            <a:endParaRPr lang="en-US" altLang="ko-KR" sz="1800" dirty="0"/>
+          </a:p>
+          <a:p>
+            <a:pPr marL="0" indent="0">
+              <a:buNone/>
+            </a:pPr>
+            <a:endParaRPr lang="en-US" altLang="ko-KR" sz="1800" dirty="0"/>
+          </a:p>
+          <a:p>
+            <a:pPr marL="0" indent="0">
+              <a:buNone/>
+            </a:pPr>
+            <a:endParaRPr lang="en-US" altLang="ko-KR" sz="1800" dirty="0"/>
+          </a:p>
+          <a:p>
+            <a:pPr marL="0" indent="0">
+              <a:buNone/>
+            </a:pPr>
+            <a:endParaRPr lang="en-US" altLang="ko-KR" sz="2000" dirty="0"/>
+          </a:p>
+          <a:p>
+            <a:pPr marL="0" indent="0">
+              <a:buNone/>
+            </a:pPr>
+            <a:endParaRPr lang="en-US" altLang="ko-KR" dirty="0"/>
+          </a:p>
+        </p:txBody>
+      </p:sp>
+    </p:spTree>
+    <p:extLst>
+      <p:ext uri="{BB962C8B-B14F-4D97-AF65-F5344CB8AC3E}">
+        <p14:creationId xmlns:p14="http://schemas.microsoft.com/office/powerpoint/2010/main" val="2443131513"/>
+      </p:ext>
+    </p:extLst>
+  </p:cSld>
+  <p:clrMapOvr>
+    <a:masterClrMapping/>
+  </p:clrMapOvr>
+</p:sld>
+</file>
+
+<file path=ppt/slides/slide15.xml><?xml version="1.0" encoding="utf-8"?>
+<p:sld xmlns:a="http://schemas.openxmlformats.org/drawingml/2006/main" xmlns:r="http://schemas.openxmlformats.org/officeDocument/2006/relationships" xmlns:p="http://schemas.openxmlformats.org/presentationml/2006/main">
+  <p:cSld>
+    <p:spTree>
+      <p:nvGrpSpPr>
+        <p:cNvPr id="1" name="">
+          <a:extLst>
+            <a:ext uri="{FF2B5EF4-FFF2-40B4-BE49-F238E27FC236}">
+              <a16:creationId xmlns:a16="http://schemas.microsoft.com/office/drawing/2014/main" id="{92D379E0-692A-DAC7-472F-C08CA698566A}"/>
+            </a:ext>
+          </a:extLst>
+        </p:cNvPr>
+        <p:cNvGrpSpPr/>
+        <p:nvPr/>
+      </p:nvGrpSpPr>
+      <p:grpSpPr>
+        <a:xfrm>
+          <a:off x="0" y="0"/>
+          <a:ext cx="0" cy="0"/>
+          <a:chOff x="0" y="0"/>
+          <a:chExt cx="0" cy="0"/>
+        </a:xfrm>
+      </p:grpSpPr>
+      <p:sp>
+        <p:nvSpPr>
+          <p:cNvPr id="2" name="제목 1">
+            <a:extLst>
+              <a:ext uri="{FF2B5EF4-FFF2-40B4-BE49-F238E27FC236}">
+                <a16:creationId xmlns:a16="http://schemas.microsoft.com/office/drawing/2014/main" id="{CDC9F8CE-3396-AE4F-7DD8-858CE0F3CF97}"/>
+              </a:ext>
+            </a:extLst>
+          </p:cNvPr>
+          <p:cNvSpPr>
+            <a:spLocks noGrp="1"/>
+          </p:cNvSpPr>
+          <p:nvPr>
+            <p:ph type="title"/>
+          </p:nvPr>
+        </p:nvSpPr>
+        <p:spPr/>
+        <p:txBody>
+          <a:bodyPr/>
+          <a:lstStyle/>
+          <a:p>
+            <a:r>
+              <a:rPr lang="en-US" altLang="ko-KR" dirty="0"/>
+              <a:t>MESI protocol</a:t>
+            </a:r>
+            <a:endParaRPr lang="ko-KR" altLang="en-US" dirty="0"/>
+          </a:p>
+        </p:txBody>
+      </p:sp>
+      <p:sp>
+        <p:nvSpPr>
+          <p:cNvPr id="3" name="내용 개체 틀 2">
+            <a:extLst>
+              <a:ext uri="{FF2B5EF4-FFF2-40B4-BE49-F238E27FC236}">
+                <a16:creationId xmlns:a16="http://schemas.microsoft.com/office/drawing/2014/main" id="{506E2615-5B9A-C428-9DA4-7FC8F2CF952A}"/>
+              </a:ext>
+            </a:extLst>
+          </p:cNvPr>
+          <p:cNvSpPr>
+            <a:spLocks noGrp="1"/>
+          </p:cNvSpPr>
+          <p:nvPr>
+            <p:ph idx="1"/>
+          </p:nvPr>
+        </p:nvSpPr>
+        <p:spPr/>
+        <p:txBody>
+          <a:bodyPr>
+            <a:normAutofit fontScale="85000" lnSpcReduction="20000"/>
+          </a:bodyPr>
+          <a:lstStyle/>
+          <a:p>
+            <a:pPr marL="0" indent="0">
+              <a:buNone/>
+            </a:pPr>
+            <a:r>
+              <a:rPr lang="en-US" altLang="ko-KR" sz="2400" dirty="0"/>
+              <a:t>-Modified :  different with dram.</a:t>
+            </a:r>
+          </a:p>
+          <a:p>
+            <a:pPr marL="0" indent="0">
+              <a:buNone/>
+            </a:pPr>
+            <a:r>
+              <a:rPr lang="en-US" altLang="ko-KR" sz="2400" dirty="0"/>
+              <a:t>-Exclusive : same with dram and no shared.</a:t>
+            </a:r>
+          </a:p>
+          <a:p>
+            <a:pPr marL="0" indent="0">
+              <a:buNone/>
+            </a:pPr>
+            <a:r>
+              <a:rPr lang="en-US" altLang="ko-KR" sz="2400" dirty="0"/>
+              <a:t>-Shared : Same with dram, and </a:t>
+            </a:r>
+          </a:p>
+          <a:p>
+            <a:pPr marL="0" indent="0">
+              <a:buNone/>
+            </a:pPr>
+            <a:r>
+              <a:rPr lang="en-US" altLang="ko-KR" sz="2400" dirty="0"/>
+              <a:t>-Invalid : invalid useless data. Do not affect to coherence</a:t>
+            </a:r>
+          </a:p>
+          <a:p>
+            <a:pPr marL="457200" indent="-457200">
+              <a:buAutoNum type="arabicParenR"/>
+            </a:pPr>
+            <a:r>
+              <a:rPr lang="en-US" altLang="ko-KR" sz="2400" dirty="0"/>
+              <a:t>If we access to M-state, M-state do write back and changed to S-state. eventually there’s two of S-state. (write-back).</a:t>
+            </a:r>
+          </a:p>
+          <a:p>
+            <a:pPr marL="0" indent="0">
+              <a:buNone/>
+            </a:pPr>
+            <a:r>
+              <a:rPr lang="en-US" altLang="ko-KR" sz="2400" dirty="0"/>
+              <a:t>In this case. Both CPU have to wait 100 cycles until write-back is complete.</a:t>
+            </a:r>
+          </a:p>
+          <a:p>
+            <a:pPr marL="0" indent="0">
+              <a:buNone/>
+            </a:pPr>
+            <a:r>
+              <a:rPr lang="en-US" altLang="ko-KR" sz="2400" dirty="0"/>
+              <a:t>And CPU which owns M-state cache lines change its processing to write back.</a:t>
+            </a:r>
+          </a:p>
+          <a:p>
+            <a:pPr marL="0" indent="0">
+              <a:buNone/>
+            </a:pPr>
+            <a:r>
+              <a:rPr lang="en-US" altLang="ko-KR" sz="2400" dirty="0"/>
+              <a:t>2) If we access to M-state, M-state change to I-state and give data to accessing </a:t>
+            </a:r>
+            <a:r>
+              <a:rPr lang="en-US" altLang="ko-KR" sz="2400" dirty="0" err="1"/>
+              <a:t>cache_line</a:t>
+            </a:r>
+            <a:r>
+              <a:rPr lang="en-US" altLang="ko-KR" sz="2400" dirty="0"/>
+              <a:t> directly. Then accessing cache line change its state to M-state. (write-back?) </a:t>
+            </a:r>
+            <a:r>
+              <a:rPr lang="en-US" altLang="ko-KR" sz="2400" b="1" dirty="0"/>
+              <a:t>discuss later -&gt; it is Illinois MESI. So then. Implement method 1</a:t>
+            </a:r>
+          </a:p>
+          <a:p>
+            <a:pPr marL="0" indent="0">
+              <a:buNone/>
+            </a:pPr>
+            <a:endParaRPr lang="en-US" altLang="ko-KR" sz="2400" b="1" dirty="0"/>
+          </a:p>
+          <a:p>
+            <a:pPr marL="0" indent="0">
+              <a:buNone/>
+            </a:pPr>
+            <a:r>
+              <a:rPr lang="en-US" altLang="ko-KR" sz="2400" dirty="0"/>
+              <a:t>If store instruction comes, we do not store this data to other caches. Only cache that receive the instruction update to M-state</a:t>
+            </a:r>
+          </a:p>
+          <a:p>
+            <a:pPr marL="0" indent="0">
+              <a:buNone/>
+            </a:pPr>
+            <a:endParaRPr lang="ko-KR" altLang="en-US" dirty="0"/>
+          </a:p>
+        </p:txBody>
+      </p:sp>
+    </p:spTree>
+    <p:extLst>
+      <p:ext uri="{BB962C8B-B14F-4D97-AF65-F5344CB8AC3E}">
+        <p14:creationId xmlns:p14="http://schemas.microsoft.com/office/powerpoint/2010/main" val="2287133661"/>
+      </p:ext>
+    </p:extLst>
+  </p:cSld>
+  <p:clrMapOvr>
+    <a:masterClrMapping/>
+  </p:clrMapOvr>
+</p:sld>
+</file>
+
+<file path=ppt/slides/slide16.xml><?xml version="1.0" encoding="utf-8"?>
+<p:sld xmlns:a="http://schemas.openxmlformats.org/drawingml/2006/main" xmlns:r="http://schemas.openxmlformats.org/officeDocument/2006/relationships" xmlns:p="http://schemas.openxmlformats.org/presentationml/2006/main">
+  <p:cSld>
+    <p:spTree>
+      <p:nvGrpSpPr>
+        <p:cNvPr id="1" name="">
+          <a:extLst>
+            <a:ext uri="{FF2B5EF4-FFF2-40B4-BE49-F238E27FC236}">
+              <a16:creationId xmlns:a16="http://schemas.microsoft.com/office/drawing/2014/main" id="{786B409A-FC27-B071-4B38-DADE6F8ED2B7}"/>
+            </a:ext>
+          </a:extLst>
+        </p:cNvPr>
+        <p:cNvGrpSpPr/>
+        <p:nvPr/>
+      </p:nvGrpSpPr>
+      <p:grpSpPr>
+        <a:xfrm>
+          <a:off x="0" y="0"/>
+          <a:ext cx="0" cy="0"/>
+          <a:chOff x="0" y="0"/>
+          <a:chExt cx="0" cy="0"/>
+        </a:xfrm>
+      </p:grpSpPr>
+      <p:sp>
+        <p:nvSpPr>
+          <p:cNvPr id="2" name="제목 1">
+            <a:extLst>
+              <a:ext uri="{FF2B5EF4-FFF2-40B4-BE49-F238E27FC236}">
+                <a16:creationId xmlns:a16="http://schemas.microsoft.com/office/drawing/2014/main" id="{4441FD43-F27C-490E-BE58-49CFB6D325BE}"/>
+              </a:ext>
+            </a:extLst>
+          </p:cNvPr>
+          <p:cNvSpPr>
+            <a:spLocks noGrp="1"/>
+          </p:cNvSpPr>
+          <p:nvPr>
+            <p:ph type="title"/>
+          </p:nvPr>
+        </p:nvSpPr>
+        <p:spPr/>
+        <p:txBody>
+          <a:bodyPr/>
+          <a:lstStyle/>
+          <a:p>
+            <a:r>
+              <a:rPr lang="en-US" altLang="ko-KR" dirty="0"/>
+              <a:t>MESI protocol</a:t>
+            </a:r>
+            <a:endParaRPr lang="ko-KR" altLang="en-US" dirty="0"/>
+          </a:p>
+        </p:txBody>
+      </p:sp>
+      <p:sp>
+        <p:nvSpPr>
+          <p:cNvPr id="3" name="내용 개체 틀 2">
+            <a:extLst>
+              <a:ext uri="{FF2B5EF4-FFF2-40B4-BE49-F238E27FC236}">
+                <a16:creationId xmlns:a16="http://schemas.microsoft.com/office/drawing/2014/main" id="{17582E79-E4D7-B26A-4AB0-9A93952F094D}"/>
+              </a:ext>
+            </a:extLst>
+          </p:cNvPr>
+          <p:cNvSpPr>
+            <a:spLocks noGrp="1"/>
+          </p:cNvSpPr>
+          <p:nvPr>
+            <p:ph idx="1"/>
+          </p:nvPr>
+        </p:nvSpPr>
+        <p:spPr/>
+        <p:txBody>
+          <a:bodyPr>
+            <a:normAutofit lnSpcReduction="10000"/>
+          </a:bodyPr>
+          <a:lstStyle/>
+          <a:p>
+            <a:pPr marL="457200" indent="-457200">
+              <a:buAutoNum type="arabicParenR"/>
+            </a:pPr>
+            <a:r>
+              <a:rPr lang="en-US" altLang="ko-KR" sz="1800" dirty="0"/>
+              <a:t>If we access to M-state, M-state do write back and changed to S-state. eventually there’s two of S-state. (write-back).</a:t>
+            </a:r>
+          </a:p>
+          <a:p>
+            <a:pPr marL="0" indent="0">
+              <a:buNone/>
+            </a:pPr>
+            <a:r>
+              <a:rPr lang="en-US" altLang="ko-KR" sz="1800" dirty="0"/>
+              <a:t>In this case. Both CPU have to wait 100 cycles until write-back is complete.</a:t>
+            </a:r>
+          </a:p>
+          <a:p>
+            <a:pPr marL="0" indent="0">
+              <a:buNone/>
+            </a:pPr>
+            <a:r>
+              <a:rPr lang="en-US" altLang="ko-KR" sz="1800" dirty="0"/>
+              <a:t>And CPU which owns M-state cache lines change its processing to write back.</a:t>
+            </a:r>
+          </a:p>
+          <a:p>
+            <a:pPr marL="0" indent="0">
+              <a:buNone/>
+            </a:pPr>
+            <a:r>
+              <a:rPr lang="en-US" altLang="ko-KR" sz="1800" dirty="0"/>
+              <a:t>2) If we access to M-state, M-state change to I-state and give data to accessing </a:t>
+            </a:r>
+            <a:r>
+              <a:rPr lang="en-US" altLang="ko-KR" sz="1800" dirty="0" err="1"/>
+              <a:t>cache_line</a:t>
+            </a:r>
+            <a:r>
+              <a:rPr lang="en-US" altLang="ko-KR" sz="1800" dirty="0"/>
+              <a:t> directly. Then accessing cache line change its state to M-state. (write-back?) </a:t>
+            </a:r>
+            <a:r>
+              <a:rPr lang="en-US" altLang="ko-KR" sz="1800" b="1" dirty="0"/>
+              <a:t>discuss later -&gt; it is Illinois MESI. So then. Implement method 1</a:t>
+            </a:r>
+          </a:p>
+          <a:p>
+            <a:pPr marL="0" indent="0">
+              <a:buNone/>
+            </a:pPr>
+            <a:endParaRPr lang="en-US" altLang="ko-KR" sz="1800" b="1" dirty="0"/>
+          </a:p>
+          <a:p>
+            <a:pPr marL="0" indent="0">
+              <a:buNone/>
+            </a:pPr>
+            <a:r>
+              <a:rPr lang="en-US" altLang="ko-KR" sz="2000" dirty="0" err="1"/>
+              <a:t>waiting_write_back</a:t>
+            </a:r>
+            <a:r>
+              <a:rPr lang="en-US" altLang="ko-KR" sz="2000" dirty="0"/>
+              <a:t>. 1) situation.</a:t>
+            </a:r>
+          </a:p>
+          <a:p>
+            <a:pPr marL="0" indent="0">
+              <a:buNone/>
+            </a:pPr>
+            <a:r>
+              <a:rPr lang="en-US" altLang="ko-KR" sz="2000" dirty="0"/>
+              <a:t>set this variable to 100. and wait this cycles before execute other instructions.</a:t>
+            </a:r>
+          </a:p>
+          <a:p>
+            <a:pPr marL="0" indent="0">
+              <a:buNone/>
+            </a:pPr>
+            <a:r>
+              <a:rPr lang="en-US" altLang="ko-KR" sz="2000" dirty="0"/>
+              <a:t>, and when M-state cache line is evicted.</a:t>
+            </a:r>
+          </a:p>
+          <a:p>
+            <a:pPr marL="0" indent="0">
+              <a:buNone/>
+            </a:pPr>
+            <a:r>
+              <a:rPr lang="en-US" altLang="ko-KR" sz="2000" b="1" dirty="0"/>
+              <a:t>,,,,, write-back, and load, So then, total 200 cycles? Or write-back, and bus transaction total 102 cycles?... Now implemented 102 cycles.</a:t>
+            </a:r>
+            <a:endParaRPr lang="ko-KR" altLang="en-US" sz="2000" b="1" dirty="0"/>
+          </a:p>
+        </p:txBody>
+      </p:sp>
+    </p:spTree>
+    <p:extLst>
+      <p:ext uri="{BB962C8B-B14F-4D97-AF65-F5344CB8AC3E}">
+        <p14:creationId xmlns:p14="http://schemas.microsoft.com/office/powerpoint/2010/main" val="3882868284"/>
+      </p:ext>
+    </p:extLst>
+  </p:cSld>
+  <p:clrMapOvr>
+    <a:masterClrMapping/>
+  </p:clrMapOvr>
+</p:sld>
+</file>
+
+<file path=ppt/slides/slide17.xml><?xml version="1.0" encoding="utf-8"?>
+<p:sld xmlns:a="http://schemas.openxmlformats.org/drawingml/2006/main" xmlns:r="http://schemas.openxmlformats.org/officeDocument/2006/relationships" xmlns:p="http://schemas.openxmlformats.org/presentationml/2006/main">
+  <p:cSld>
+    <p:spTree>
+      <p:nvGrpSpPr>
+        <p:cNvPr id="1" name="">
+          <a:extLst>
+            <a:ext uri="{FF2B5EF4-FFF2-40B4-BE49-F238E27FC236}">
+              <a16:creationId xmlns:a16="http://schemas.microsoft.com/office/drawing/2014/main" id="{DDF742C0-F95B-32A5-449B-9060D60B3F43}"/>
+            </a:ext>
+          </a:extLst>
+        </p:cNvPr>
+        <p:cNvGrpSpPr/>
+        <p:nvPr/>
+      </p:nvGrpSpPr>
+      <p:grpSpPr>
+        <a:xfrm>
+          <a:off x="0" y="0"/>
+          <a:ext cx="0" cy="0"/>
+          <a:chOff x="0" y="0"/>
+          <a:chExt cx="0" cy="0"/>
+        </a:xfrm>
+      </p:grpSpPr>
+      <p:sp>
+        <p:nvSpPr>
+          <p:cNvPr id="2" name="제목 1">
+            <a:extLst>
+              <a:ext uri="{FF2B5EF4-FFF2-40B4-BE49-F238E27FC236}">
+                <a16:creationId xmlns:a16="http://schemas.microsoft.com/office/drawing/2014/main" id="{E03E84E0-2C22-F84C-DF81-05CB4CE74011}"/>
+              </a:ext>
+            </a:extLst>
+          </p:cNvPr>
+          <p:cNvSpPr>
+            <a:spLocks noGrp="1"/>
+          </p:cNvSpPr>
+          <p:nvPr>
+            <p:ph type="title"/>
+          </p:nvPr>
+        </p:nvSpPr>
+        <p:spPr/>
+        <p:txBody>
+          <a:bodyPr/>
+          <a:lstStyle/>
+          <a:p>
+            <a:r>
+              <a:rPr lang="en-US" altLang="ko-KR" dirty="0"/>
+              <a:t>Dragon-state</a:t>
+            </a:r>
+            <a:endParaRPr lang="ko-KR" altLang="en-US" dirty="0"/>
+          </a:p>
+        </p:txBody>
+      </p:sp>
+      <p:sp>
+        <p:nvSpPr>
+          <p:cNvPr id="3" name="내용 개체 틀 2">
+            <a:extLst>
+              <a:ext uri="{FF2B5EF4-FFF2-40B4-BE49-F238E27FC236}">
+                <a16:creationId xmlns:a16="http://schemas.microsoft.com/office/drawing/2014/main" id="{1990BECF-03CD-F3F3-082D-0A69C9D55158}"/>
+              </a:ext>
+            </a:extLst>
+          </p:cNvPr>
+          <p:cNvSpPr>
+            <a:spLocks noGrp="1"/>
+          </p:cNvSpPr>
+          <p:nvPr>
+            <p:ph idx="1"/>
+          </p:nvPr>
+        </p:nvSpPr>
+        <p:spPr/>
+        <p:txBody>
+          <a:bodyPr/>
+          <a:lstStyle/>
+          <a:p>
+            <a:endParaRPr lang="ko-KR" altLang="en-US"/>
+          </a:p>
+        </p:txBody>
+      </p:sp>
+    </p:spTree>
+    <p:extLst>
+      <p:ext uri="{BB962C8B-B14F-4D97-AF65-F5344CB8AC3E}">
+        <p14:creationId xmlns:p14="http://schemas.microsoft.com/office/powerpoint/2010/main" val="2248027415"/>
+      </p:ext>
+    </p:extLst>
+  </p:cSld>
+  <p:clrMapOvr>
+    <a:masterClrMapping/>
+  </p:clrMapOvr>
+</p:sld>
+</file>
+
+<file path=ppt/slides/slide18.xml><?xml version="1.0" encoding="utf-8"?>
+<p:sld xmlns:a="http://schemas.openxmlformats.org/drawingml/2006/main" xmlns:r="http://schemas.openxmlformats.org/officeDocument/2006/relationships" xmlns:p="http://schemas.openxmlformats.org/presentationml/2006/main">
+  <p:cSld>
+    <p:spTree>
+      <p:nvGrpSpPr>
+        <p:cNvPr id="1" name="">
+          <a:extLst>
+            <a:ext uri="{FF2B5EF4-FFF2-40B4-BE49-F238E27FC236}">
+              <a16:creationId xmlns:a16="http://schemas.microsoft.com/office/drawing/2014/main" id="{21E3A386-4ABF-7A9C-AC76-B5EC8A842DD7}"/>
+            </a:ext>
+          </a:extLst>
+        </p:cNvPr>
+        <p:cNvGrpSpPr/>
+        <p:nvPr/>
+      </p:nvGrpSpPr>
+      <p:grpSpPr>
+        <a:xfrm>
+          <a:off x="0" y="0"/>
+          <a:ext cx="0" cy="0"/>
+          <a:chOff x="0" y="0"/>
+          <a:chExt cx="0" cy="0"/>
+        </a:xfrm>
+      </p:grpSpPr>
+      <p:sp>
+        <p:nvSpPr>
+          <p:cNvPr id="2" name="제목 1">
+            <a:extLst>
+              <a:ext uri="{FF2B5EF4-FFF2-40B4-BE49-F238E27FC236}">
+                <a16:creationId xmlns:a16="http://schemas.microsoft.com/office/drawing/2014/main" id="{8DEC2983-F4AF-098B-5DDB-2CA8F92C70B0}"/>
+              </a:ext>
+            </a:extLst>
+          </p:cNvPr>
+          <p:cNvSpPr>
+            <a:spLocks noGrp="1"/>
+          </p:cNvSpPr>
+          <p:nvPr>
+            <p:ph type="title"/>
+          </p:nvPr>
+        </p:nvSpPr>
+        <p:spPr/>
+        <p:txBody>
+          <a:bodyPr/>
+          <a:lstStyle/>
+          <a:p>
+            <a:r>
+              <a:rPr lang="en-US" altLang="ko-KR" dirty="0"/>
+              <a:t>Cache eviction</a:t>
+            </a:r>
+            <a:endParaRPr lang="ko-KR" altLang="en-US" dirty="0"/>
+          </a:p>
+        </p:txBody>
+      </p:sp>
+      <p:sp>
+        <p:nvSpPr>
+          <p:cNvPr id="3" name="내용 개체 틀 2">
+            <a:extLst>
+              <a:ext uri="{FF2B5EF4-FFF2-40B4-BE49-F238E27FC236}">
+                <a16:creationId xmlns:a16="http://schemas.microsoft.com/office/drawing/2014/main" id="{5768E7D9-26C3-D8B8-A36F-63C01A21CE4E}"/>
+              </a:ext>
+            </a:extLst>
+          </p:cNvPr>
+          <p:cNvSpPr>
+            <a:spLocks noGrp="1"/>
+          </p:cNvSpPr>
+          <p:nvPr>
+            <p:ph idx="1"/>
+          </p:nvPr>
+        </p:nvSpPr>
+        <p:spPr/>
+        <p:txBody>
+          <a:bodyPr/>
+          <a:lstStyle/>
+          <a:p>
+            <a:pPr marL="0" indent="0">
+              <a:buNone/>
+            </a:pPr>
+            <a:r>
+              <a:rPr lang="en-US" altLang="ko-KR" dirty="0"/>
+              <a:t>When?</a:t>
+            </a:r>
+          </a:p>
+          <a:p>
+            <a:pPr marL="0" indent="0">
+              <a:buNone/>
+            </a:pPr>
+            <a:r>
+              <a:rPr lang="en-US" altLang="ko-KR" dirty="0"/>
+              <a:t>Cache miss.</a:t>
+            </a:r>
+          </a:p>
+          <a:p>
+            <a:pPr marL="0" indent="0">
+              <a:buNone/>
+            </a:pPr>
+            <a:r>
+              <a:rPr lang="en-US" altLang="ko-KR" dirty="0"/>
+              <a:t>Who?</a:t>
+            </a:r>
+          </a:p>
+          <a:p>
+            <a:pPr marL="0" indent="0">
+              <a:buNone/>
+            </a:pPr>
+            <a:r>
+              <a:rPr lang="en-US" altLang="ko-KR" dirty="0"/>
+              <a:t>By LRU policy, last recently used cache line, but we check ‘invalid’ first.</a:t>
+            </a:r>
+          </a:p>
+          <a:p>
+            <a:pPr marL="0" indent="0">
+              <a:buNone/>
+            </a:pPr>
+            <a:r>
+              <a:rPr lang="en-US" altLang="ko-KR" sz="2000" dirty="0"/>
+              <a:t>If we make other cache line to ‘invalid’, move the cache line to LRU tail.(</a:t>
+            </a:r>
+            <a:r>
+              <a:rPr lang="en-US" altLang="ko-KR" sz="2000" dirty="0" err="1">
+                <a:solidFill>
+                  <a:schemeClr val="accent2"/>
+                </a:solidFill>
+              </a:rPr>
+              <a:t>set.splice</a:t>
+            </a:r>
+            <a:r>
+              <a:rPr lang="en-US" altLang="ko-KR" sz="2000" dirty="0">
+                <a:solidFill>
+                  <a:schemeClr val="accent2"/>
+                </a:solidFill>
+              </a:rPr>
+              <a:t>(</a:t>
+            </a:r>
+            <a:r>
+              <a:rPr lang="en-US" altLang="ko-KR" sz="2000" dirty="0" err="1">
+                <a:solidFill>
+                  <a:schemeClr val="accent2"/>
+                </a:solidFill>
+              </a:rPr>
+              <a:t>set.end</a:t>
+            </a:r>
+            <a:r>
+              <a:rPr lang="en-US" altLang="ko-KR" sz="2000" dirty="0">
+                <a:solidFill>
+                  <a:schemeClr val="accent2"/>
+                </a:solidFill>
+              </a:rPr>
+              <a:t>(), set, it); </a:t>
+            </a:r>
+            <a:r>
+              <a:rPr lang="en-US" altLang="ko-KR" sz="2000" dirty="0"/>
+              <a:t>)</a:t>
+            </a:r>
+            <a:endParaRPr lang="en-US" altLang="ko-KR" sz="2000" dirty="0">
+              <a:solidFill>
+                <a:schemeClr val="accent2"/>
+              </a:solidFill>
+            </a:endParaRPr>
+          </a:p>
+          <a:p>
+            <a:pPr marL="0" indent="0">
+              <a:buNone/>
+            </a:pPr>
+            <a:endParaRPr lang="en-US" altLang="ko-KR" dirty="0"/>
+          </a:p>
+        </p:txBody>
+      </p:sp>
+    </p:spTree>
+    <p:extLst>
+      <p:ext uri="{BB962C8B-B14F-4D97-AF65-F5344CB8AC3E}">
+        <p14:creationId xmlns:p14="http://schemas.microsoft.com/office/powerpoint/2010/main" val="3002452453"/>
+      </p:ext>
+    </p:extLst>
+  </p:cSld>
+  <p:clrMapOvr>
+    <a:masterClrMapping/>
+  </p:clrMapOvr>
+</p:sld>
+</file>
+
+<file path=ppt/slides/slide19.xml><?xml version="1.0" encoding="utf-8"?>
+<p:sld xmlns:a="http://schemas.openxmlformats.org/drawingml/2006/main" xmlns:r="http://schemas.openxmlformats.org/officeDocument/2006/relationships" xmlns:p="http://schemas.openxmlformats.org/presentationml/2006/main">
+  <p:cSld>
+    <p:spTree>
+      <p:nvGrpSpPr>
+        <p:cNvPr id="1" name="">
+          <a:extLst>
+            <a:ext uri="{FF2B5EF4-FFF2-40B4-BE49-F238E27FC236}">
+              <a16:creationId xmlns:a16="http://schemas.microsoft.com/office/drawing/2014/main" id="{BD86CEC6-2979-0A1E-5CA4-25010ABCD73B}"/>
+            </a:ext>
+          </a:extLst>
+        </p:cNvPr>
+        <p:cNvGrpSpPr/>
+        <p:nvPr/>
+      </p:nvGrpSpPr>
+      <p:grpSpPr>
+        <a:xfrm>
+          <a:off x="0" y="0"/>
+          <a:ext cx="0" cy="0"/>
+          <a:chOff x="0" y="0"/>
+          <a:chExt cx="0" cy="0"/>
+        </a:xfrm>
+      </p:grpSpPr>
+      <p:sp>
+        <p:nvSpPr>
+          <p:cNvPr id="2" name="제목 1">
+            <a:extLst>
+              <a:ext uri="{FF2B5EF4-FFF2-40B4-BE49-F238E27FC236}">
+                <a16:creationId xmlns:a16="http://schemas.microsoft.com/office/drawing/2014/main" id="{81332FC3-9E98-52AC-5773-AF7E56F1E5E9}"/>
+              </a:ext>
+            </a:extLst>
+          </p:cNvPr>
+          <p:cNvSpPr>
+            <a:spLocks noGrp="1"/>
+          </p:cNvSpPr>
+          <p:nvPr>
+            <p:ph type="title"/>
+          </p:nvPr>
+        </p:nvSpPr>
+        <p:spPr/>
+        <p:txBody>
+          <a:bodyPr/>
+          <a:lstStyle/>
+          <a:p>
+            <a:r>
+              <a:rPr lang="en-US" altLang="ko-KR" dirty="0"/>
+              <a:t>Functions</a:t>
+            </a:r>
+            <a:endParaRPr lang="ko-KR" altLang="en-US" dirty="0"/>
+          </a:p>
+        </p:txBody>
+      </p:sp>
+      <p:sp>
+        <p:nvSpPr>
+          <p:cNvPr id="3" name="내용 개체 틀 2">
+            <a:extLst>
+              <a:ext uri="{FF2B5EF4-FFF2-40B4-BE49-F238E27FC236}">
+                <a16:creationId xmlns:a16="http://schemas.microsoft.com/office/drawing/2014/main" id="{709F29CC-571D-0902-AAF4-214A38E77596}"/>
+              </a:ext>
+            </a:extLst>
+          </p:cNvPr>
+          <p:cNvSpPr>
+            <a:spLocks noGrp="1"/>
+          </p:cNvSpPr>
+          <p:nvPr>
+            <p:ph idx="1"/>
+          </p:nvPr>
+        </p:nvSpPr>
+        <p:spPr/>
+        <p:txBody>
+          <a:bodyPr/>
+          <a:lstStyle/>
+          <a:p>
+            <a:pPr marL="0" indent="0">
+              <a:buNone/>
+            </a:pPr>
+            <a:r>
+              <a:rPr lang="en-US" altLang="ko-KR" sz="2400" dirty="0" err="1"/>
+              <a:t>Cache.access</a:t>
+            </a:r>
+            <a:r>
+              <a:rPr lang="en-US" altLang="ko-KR" sz="2400" dirty="0"/>
+              <a:t> : return cache line’s MESI state or when miss, return false</a:t>
+            </a:r>
+          </a:p>
+          <a:p>
+            <a:pPr marL="0" indent="0">
+              <a:buNone/>
+            </a:pPr>
+            <a:r>
+              <a:rPr lang="en-US" altLang="ko-KR" sz="2400" dirty="0" err="1"/>
+              <a:t>Cache.update</a:t>
+            </a:r>
+            <a:r>
+              <a:rPr lang="en-US" altLang="ko-KR" sz="2400" dirty="0"/>
+              <a:t> : update cache line to input MESI state. If cache line is not cached, replace by using LRU.</a:t>
+            </a:r>
+          </a:p>
+          <a:p>
+            <a:pPr marL="0" indent="0">
+              <a:buNone/>
+            </a:pPr>
+            <a:r>
+              <a:rPr lang="en-US" altLang="ko-KR" sz="2400" dirty="0" err="1"/>
+              <a:t>Cache.Bus_invalid</a:t>
+            </a:r>
+            <a:r>
+              <a:rPr lang="en-US" altLang="ko-KR" sz="2400" dirty="0"/>
+              <a:t> : invalid other cache lines. </a:t>
+            </a:r>
+            <a:r>
+              <a:rPr lang="en-US" altLang="ko-KR" sz="2400"/>
+              <a:t>For implementing M-state.</a:t>
+            </a:r>
+          </a:p>
+          <a:p>
+            <a:pPr marL="0" indent="0">
+              <a:buNone/>
+            </a:pPr>
+            <a:endParaRPr lang="en-US" altLang="ko-KR" sz="2400" dirty="0"/>
+          </a:p>
+          <a:p>
+            <a:pPr marL="0" indent="0">
+              <a:buNone/>
+            </a:pPr>
+            <a:endParaRPr lang="en-US" altLang="ko-KR" sz="2400" dirty="0"/>
+          </a:p>
+          <a:p>
+            <a:pPr marL="0" indent="0">
+              <a:buNone/>
+            </a:pPr>
+            <a:endParaRPr lang="en-US" altLang="ko-KR" dirty="0"/>
+          </a:p>
+        </p:txBody>
+      </p:sp>
+    </p:spTree>
+    <p:extLst>
+      <p:ext uri="{BB962C8B-B14F-4D97-AF65-F5344CB8AC3E}">
+        <p14:creationId xmlns:p14="http://schemas.microsoft.com/office/powerpoint/2010/main" val="4264938509"/>
+      </p:ext>
+    </p:extLst>
+  </p:cSld>
+  <p:clrMapOvr>
+    <a:masterClrMapping/>
+  </p:clrMapOvr>
+</p:sld>
+</file>
+
 <file path=ppt/slides/slide2.xml><?xml version="1.0" encoding="utf-8"?>
 <p:sld xmlns:a="http://schemas.openxmlformats.org/drawingml/2006/main" xmlns:r="http://schemas.openxmlformats.org/officeDocument/2006/relationships" xmlns:p="http://schemas.openxmlformats.org/presentationml/2006/main">
   <p:cSld>
@@ -7105,21 +8978,33 @@
             </a:r>
           </a:p>
           <a:p>
+            <a:pPr marL="285750" indent="-285750">
+              <a:buFont typeface="Wingdings" panose="05000000000000000000" pitchFamily="2" charset="2"/>
+              <a:buChar char="è"/>
+            </a:pPr>
             <a:r>
               <a:rPr lang="en-US" altLang="ko-KR" dirty="0"/>
-              <a:t>-&gt; label, data = Read lines</a:t>
+              <a:t>label, data = Read lines</a:t>
             </a:r>
           </a:p>
           <a:p>
             <a:r>
               <a:rPr lang="en-US" altLang="ko-KR" dirty="0"/>
-              <a:t>(case)</a:t>
+              <a:t>(case) // define target cycles by corresponding labels</a:t>
             </a:r>
           </a:p>
           <a:p>
             <a:r>
               <a:rPr lang="en-US" altLang="ko-KR" dirty="0"/>
-              <a:t>Label 0 : memory access and mutex lock. and Set “</a:t>
+              <a:t>Label 0 : Cache access, bus </a:t>
+            </a:r>
+            <a:r>
+              <a:rPr lang="en-US" altLang="ko-KR" dirty="0" err="1"/>
+              <a:t>access.then</a:t>
+            </a:r>
+            <a:r>
+              <a:rPr lang="en-US" altLang="ko-KR" dirty="0"/>
+              <a:t> set target cycles. Set “</a:t>
             </a:r>
             <a:r>
               <a:rPr lang="en-US" altLang="ko-KR" dirty="0" err="1"/>
@@ -7133,7 +9018,15 @@
           <a:p>
             <a:r>
               <a:rPr lang="en-US" altLang="ko-KR" dirty="0"/>
-              <a:t>Label 1 : memory access and mutex lock. And Set “</a:t>
+              <a:t>Label 1 : Cache access, bus </a:t>
+            </a:r>
+            <a:r>
+              <a:rPr lang="en-US" altLang="ko-KR" dirty="0" err="1"/>
+              <a:t>access.then</a:t>
+            </a:r>
+            <a:r>
+              <a:rPr lang="en-US" altLang="ko-KR" dirty="0"/>
+              <a:t> set target cycles. Set “</a:t>
             </a:r>
             <a:r>
               <a:rPr lang="en-US" altLang="ko-KR" dirty="0" err="1"/>

</xml_diff>